<commit_message>
AutoScaler and Node connection
</commit_message>
<xml_diff>
--- a/AKS_01_Core_and_Setup.pptx
+++ b/AKS_01_Core_and_Setup.pptx
@@ -20,6 +20,8 @@
     <p:sldId id="280" r:id="rId14"/>
     <p:sldId id="281" r:id="rId15"/>
     <p:sldId id="282" r:id="rId16"/>
+    <p:sldId id="334" r:id="rId17"/>
+    <p:sldId id="335" r:id="rId18"/>
   </p:sldIdLst>
   <p:sldSz cx="12192000" cy="6858000"/>
   <p:notesSz cx="6858000" cy="9144000"/>
@@ -118,13 +120,18 @@
       </a:defRPr>
     </a:lvl9pPr>
   </p:defaultTextStyle>
+  <p:extLst>
+    <p:ext uri="{EFAFB233-063F-42B5-8137-9DF3F51BA10A}">
+      <p15:sldGuideLst xmlns:p15="http://schemas.microsoft.com/office/powerpoint/2012/main"/>
+    </p:ext>
+  </p:extLst>
 </p:presentation>
 </file>
 
 <file path=ppt/revisionInfo.xml><?xml version="1.0" encoding="utf-8"?>
 <p1510:revInfo xmlns:a="http://schemas.openxmlformats.org/drawingml/2006/main" xmlns:r="http://schemas.openxmlformats.org/officeDocument/2006/relationships" xmlns:p1510="http://schemas.microsoft.com/office/powerpoint/2015/10/main">
   <p1510:revLst>
-    <p1510:client id="{15BB7F4B-7A2D-400A-BF41-C6DFD8417B3B}" v="4" dt="2026-01-16T08:41:10.507"/>
+    <p1510:client id="{15BB7F4B-7A2D-400A-BF41-C6DFD8417B3B}" v="5" dt="2026-01-21T07:46:18.986"/>
   </p1510:revLst>
 </p1510:revInfo>
 </file>
@@ -134,7 +141,7 @@
   <pc:docChgLst>
     <pc:chgData name="faik bilgen" userId="9fcb1696e65a161f" providerId="LiveId" clId="{0C3A4C9E-717D-4ADE-97E0-B0AD580B3355}"/>
     <pc:docChg chg="addSld modSld">
-      <pc:chgData name="faik bilgen" userId="9fcb1696e65a161f" providerId="LiveId" clId="{0C3A4C9E-717D-4ADE-97E0-B0AD580B3355}" dt="2026-01-16T08:41:16.293" v="71" actId="20577"/>
+      <pc:chgData name="faik bilgen" userId="9fcb1696e65a161f" providerId="LiveId" clId="{0C3A4C9E-717D-4ADE-97E0-B0AD580B3355}" dt="2026-01-21T07:46:18.974" v="72"/>
       <pc:docMkLst>
         <pc:docMk/>
       </pc:docMkLst>
@@ -198,6 +205,20 @@
           </ac:spMkLst>
         </pc:spChg>
       </pc:sldChg>
+      <pc:sldChg chg="add">
+        <pc:chgData name="faik bilgen" userId="9fcb1696e65a161f" providerId="LiveId" clId="{0C3A4C9E-717D-4ADE-97E0-B0AD580B3355}" dt="2026-01-21T07:46:18.974" v="72"/>
+        <pc:sldMkLst>
+          <pc:docMk/>
+          <pc:sldMk cId="1936368771" sldId="334"/>
+        </pc:sldMkLst>
+      </pc:sldChg>
+      <pc:sldChg chg="add">
+        <pc:chgData name="faik bilgen" userId="9fcb1696e65a161f" providerId="LiveId" clId="{0C3A4C9E-717D-4ADE-97E0-B0AD580B3355}" dt="2026-01-21T07:46:18.974" v="72"/>
+        <pc:sldMkLst>
+          <pc:docMk/>
+          <pc:sldMk cId="1409184322" sldId="335"/>
+        </pc:sldMkLst>
+      </pc:sldChg>
     </pc:docChg>
   </pc:docChgLst>
 </pc:chgInfo>
@@ -350,7 +371,7 @@
           <a:p>
             <a:fld id="{B616CDE8-C118-489E-BA54-73CDE3A64F8D}" type="datetimeFigureOut">
               <a:rPr lang="en-US" smtClean="0"/>
-              <a:t>1/16/2026</a:t>
+              <a:t>1/21/2026</a:t>
             </a:fld>
             <a:endParaRPr lang="en-US"/>
           </a:p>
@@ -548,7 +569,7 @@
           <a:p>
             <a:fld id="{B616CDE8-C118-489E-BA54-73CDE3A64F8D}" type="datetimeFigureOut">
               <a:rPr lang="en-US" smtClean="0"/>
-              <a:t>1/16/2026</a:t>
+              <a:t>1/21/2026</a:t>
             </a:fld>
             <a:endParaRPr lang="en-US"/>
           </a:p>
@@ -756,7 +777,7 @@
           <a:p>
             <a:fld id="{B616CDE8-C118-489E-BA54-73CDE3A64F8D}" type="datetimeFigureOut">
               <a:rPr lang="en-US" smtClean="0"/>
-              <a:t>1/16/2026</a:t>
+              <a:t>1/21/2026</a:t>
             </a:fld>
             <a:endParaRPr lang="en-US"/>
           </a:p>
@@ -976,7 +997,7 @@
           <a:p>
             <a:fld id="{B9268321-C9E7-441E-8ECB-F5B48CA38B30}" type="datetimeFigureOut">
               <a:rPr lang="en-US" smtClean="0"/>
-              <a:t>1/16/2026</a:t>
+              <a:t>1/21/2026</a:t>
             </a:fld>
             <a:endParaRPr lang="en-US"/>
           </a:p>
@@ -1174,7 +1195,7 @@
           <a:p>
             <a:fld id="{B9268321-C9E7-441E-8ECB-F5B48CA38B30}" type="datetimeFigureOut">
               <a:rPr lang="en-US" smtClean="0"/>
-              <a:t>1/16/2026</a:t>
+              <a:t>1/21/2026</a:t>
             </a:fld>
             <a:endParaRPr lang="en-US"/>
           </a:p>
@@ -1449,7 +1470,7 @@
           <a:p>
             <a:fld id="{B9268321-C9E7-441E-8ECB-F5B48CA38B30}" type="datetimeFigureOut">
               <a:rPr lang="en-US" smtClean="0"/>
-              <a:t>1/16/2026</a:t>
+              <a:t>1/21/2026</a:t>
             </a:fld>
             <a:endParaRPr lang="en-US"/>
           </a:p>
@@ -1714,7 +1735,7 @@
           <a:p>
             <a:fld id="{B9268321-C9E7-441E-8ECB-F5B48CA38B30}" type="datetimeFigureOut">
               <a:rPr lang="en-US" smtClean="0"/>
-              <a:t>1/16/2026</a:t>
+              <a:t>1/21/2026</a:t>
             </a:fld>
             <a:endParaRPr lang="en-US"/>
           </a:p>
@@ -2126,7 +2147,7 @@
           <a:p>
             <a:fld id="{B9268321-C9E7-441E-8ECB-F5B48CA38B30}" type="datetimeFigureOut">
               <a:rPr lang="en-US" smtClean="0"/>
-              <a:t>1/16/2026</a:t>
+              <a:t>1/21/2026</a:t>
             </a:fld>
             <a:endParaRPr lang="en-US"/>
           </a:p>
@@ -2267,7 +2288,7 @@
           <a:p>
             <a:fld id="{B9268321-C9E7-441E-8ECB-F5B48CA38B30}" type="datetimeFigureOut">
               <a:rPr lang="en-US" smtClean="0"/>
-              <a:t>1/16/2026</a:t>
+              <a:t>1/21/2026</a:t>
             </a:fld>
             <a:endParaRPr lang="en-US"/>
           </a:p>
@@ -2380,7 +2401,7 @@
           <a:p>
             <a:fld id="{B9268321-C9E7-441E-8ECB-F5B48CA38B30}" type="datetimeFigureOut">
               <a:rPr lang="en-US" smtClean="0"/>
-              <a:t>1/16/2026</a:t>
+              <a:t>1/21/2026</a:t>
             </a:fld>
             <a:endParaRPr lang="en-US"/>
           </a:p>
@@ -2691,7 +2712,7 @@
           <a:p>
             <a:fld id="{B9268321-C9E7-441E-8ECB-F5B48CA38B30}" type="datetimeFigureOut">
               <a:rPr lang="en-US" smtClean="0"/>
-              <a:t>1/16/2026</a:t>
+              <a:t>1/21/2026</a:t>
             </a:fld>
             <a:endParaRPr lang="en-US"/>
           </a:p>
@@ -2889,7 +2910,7 @@
           <a:p>
             <a:fld id="{B616CDE8-C118-489E-BA54-73CDE3A64F8D}" type="datetimeFigureOut">
               <a:rPr lang="en-US" smtClean="0"/>
-              <a:t>1/16/2026</a:t>
+              <a:t>1/21/2026</a:t>
             </a:fld>
             <a:endParaRPr lang="en-US"/>
           </a:p>
@@ -3177,7 +3198,7 @@
           <a:p>
             <a:fld id="{B9268321-C9E7-441E-8ECB-F5B48CA38B30}" type="datetimeFigureOut">
               <a:rPr lang="en-US" smtClean="0"/>
-              <a:t>1/16/2026</a:t>
+              <a:t>1/21/2026</a:t>
             </a:fld>
             <a:endParaRPr lang="en-US"/>
           </a:p>
@@ -3375,7 +3396,7 @@
           <a:p>
             <a:fld id="{B9268321-C9E7-441E-8ECB-F5B48CA38B30}" type="datetimeFigureOut">
               <a:rPr lang="en-US" smtClean="0"/>
-              <a:t>1/16/2026</a:t>
+              <a:t>1/21/2026</a:t>
             </a:fld>
             <a:endParaRPr lang="en-US"/>
           </a:p>
@@ -3583,7 +3604,7 @@
           <a:p>
             <a:fld id="{B9268321-C9E7-441E-8ECB-F5B48CA38B30}" type="datetimeFigureOut">
               <a:rPr lang="en-US" smtClean="0"/>
-              <a:t>1/16/2026</a:t>
+              <a:t>1/21/2026</a:t>
             </a:fld>
             <a:endParaRPr lang="en-US"/>
           </a:p>
@@ -3858,7 +3879,7 @@
           <a:p>
             <a:fld id="{B616CDE8-C118-489E-BA54-73CDE3A64F8D}" type="datetimeFigureOut">
               <a:rPr lang="en-US" smtClean="0"/>
-              <a:t>1/16/2026</a:t>
+              <a:t>1/21/2026</a:t>
             </a:fld>
             <a:endParaRPr lang="en-US"/>
           </a:p>
@@ -4123,7 +4144,7 @@
           <a:p>
             <a:fld id="{B616CDE8-C118-489E-BA54-73CDE3A64F8D}" type="datetimeFigureOut">
               <a:rPr lang="en-US" smtClean="0"/>
-              <a:t>1/16/2026</a:t>
+              <a:t>1/21/2026</a:t>
             </a:fld>
             <a:endParaRPr lang="en-US"/>
           </a:p>
@@ -4535,7 +4556,7 @@
           <a:p>
             <a:fld id="{B616CDE8-C118-489E-BA54-73CDE3A64F8D}" type="datetimeFigureOut">
               <a:rPr lang="en-US" smtClean="0"/>
-              <a:t>1/16/2026</a:t>
+              <a:t>1/21/2026</a:t>
             </a:fld>
             <a:endParaRPr lang="en-US"/>
           </a:p>
@@ -4676,7 +4697,7 @@
           <a:p>
             <a:fld id="{B616CDE8-C118-489E-BA54-73CDE3A64F8D}" type="datetimeFigureOut">
               <a:rPr lang="en-US" smtClean="0"/>
-              <a:t>1/16/2026</a:t>
+              <a:t>1/21/2026</a:t>
             </a:fld>
             <a:endParaRPr lang="en-US"/>
           </a:p>
@@ -4789,7 +4810,7 @@
           <a:p>
             <a:fld id="{B616CDE8-C118-489E-BA54-73CDE3A64F8D}" type="datetimeFigureOut">
               <a:rPr lang="en-US" smtClean="0"/>
-              <a:t>1/16/2026</a:t>
+              <a:t>1/21/2026</a:t>
             </a:fld>
             <a:endParaRPr lang="en-US"/>
           </a:p>
@@ -5100,7 +5121,7 @@
           <a:p>
             <a:fld id="{B616CDE8-C118-489E-BA54-73CDE3A64F8D}" type="datetimeFigureOut">
               <a:rPr lang="en-US" smtClean="0"/>
-              <a:t>1/16/2026</a:t>
+              <a:t>1/21/2026</a:t>
             </a:fld>
             <a:endParaRPr lang="en-US"/>
           </a:p>
@@ -5388,7 +5409,7 @@
           <a:p>
             <a:fld id="{B616CDE8-C118-489E-BA54-73CDE3A64F8D}" type="datetimeFigureOut">
               <a:rPr lang="en-US" smtClean="0"/>
-              <a:t>1/16/2026</a:t>
+              <a:t>1/21/2026</a:t>
             </a:fld>
             <a:endParaRPr lang="en-US"/>
           </a:p>
@@ -5629,7 +5650,7 @@
           <a:p>
             <a:fld id="{B616CDE8-C118-489E-BA54-73CDE3A64F8D}" type="datetimeFigureOut">
               <a:rPr lang="en-US" smtClean="0"/>
-              <a:t>1/16/2026</a:t>
+              <a:t>1/21/2026</a:t>
             </a:fld>
             <a:endParaRPr lang="en-US"/>
           </a:p>
@@ -6197,7 +6218,7 @@
           <a:p>
             <a:fld id="{B9268321-C9E7-441E-8ECB-F5B48CA38B30}" type="datetimeFigureOut">
               <a:rPr lang="en-US" smtClean="0"/>
-              <a:t>1/16/2026</a:t>
+              <a:t>1/21/2026</a:t>
             </a:fld>
             <a:endParaRPr lang="en-US"/>
           </a:p>
@@ -9473,6 +9494,706 @@
     <p:extLst>
       <p:ext uri="{BB962C8B-B14F-4D97-AF65-F5344CB8AC3E}">
         <p14:creationId xmlns:p14="http://schemas.microsoft.com/office/powerpoint/2010/main" val="2211351908"/>
+      </p:ext>
+    </p:extLst>
+  </p:cSld>
+  <p:clrMapOvr>
+    <a:masterClrMapping/>
+  </p:clrMapOvr>
+</p:sld>
+</file>
+
+<file path=ppt/slides/slide15.xml><?xml version="1.0" encoding="utf-8"?>
+<p:sld xmlns:a="http://schemas.openxmlformats.org/drawingml/2006/main" xmlns:r="http://schemas.openxmlformats.org/officeDocument/2006/relationships" xmlns:p="http://schemas.openxmlformats.org/presentationml/2006/main">
+  <p:cSld>
+    <p:bg>
+      <p:bgPr>
+        <a:solidFill>
+          <a:schemeClr val="bg1"/>
+        </a:solidFill>
+        <a:effectLst/>
+      </p:bgPr>
+    </p:bg>
+    <p:spTree>
+      <p:nvGrpSpPr>
+        <p:cNvPr id="1" name=""/>
+        <p:cNvGrpSpPr/>
+        <p:nvPr/>
+      </p:nvGrpSpPr>
+      <p:grpSpPr>
+        <a:xfrm>
+          <a:off x="0" y="0"/>
+          <a:ext cx="0" cy="0"/>
+          <a:chOff x="0" y="0"/>
+          <a:chExt cx="0" cy="0"/>
+        </a:xfrm>
+      </p:grpSpPr>
+      <p:sp useBgFill="1">
+        <p:nvSpPr>
+          <p:cNvPr id="24" name="Rectangle 23">
+            <a:extLst>
+              <a:ext uri="{FF2B5EF4-FFF2-40B4-BE49-F238E27FC236}">
+                <a16:creationId xmlns:a16="http://schemas.microsoft.com/office/drawing/2014/main" id="{389575E1-3389-451A-A5F7-27854C25C599}"/>
+              </a:ext>
+              <a:ext uri="{C183D7F6-B498-43B3-948B-1728B52AA6E4}">
+                <adec:decorative xmlns:adec="http://schemas.microsoft.com/office/drawing/2017/decorative" val="1"/>
+              </a:ext>
+            </a:extLst>
+          </p:cNvPr>
+          <p:cNvSpPr>
+            <a:spLocks noGrp="1" noRot="1" noChangeAspect="1" noMove="1" noResize="1" noEditPoints="1" noAdjustHandles="1" noChangeArrowheads="1" noChangeShapeType="1" noTextEdit="1"/>
+          </p:cNvSpPr>
+          <p:nvPr>
+            <p:extLst>
+              <p:ext uri="{386F3935-93C4-4BCD-93E2-E3B085C9AB24}">
+                <p16:designElem xmlns:p16="http://schemas.microsoft.com/office/powerpoint/2015/main" val="1"/>
+              </p:ext>
+            </p:extLst>
+          </p:nvPr>
+        </p:nvSpPr>
+        <p:spPr>
+          <a:xfrm>
+            <a:off x="3048" y="4293"/>
+            <a:ext cx="12188952" cy="6858000"/>
+          </a:xfrm>
+          <a:prstGeom prst="rect">
+            <a:avLst/>
+          </a:prstGeom>
+          <a:ln>
+            <a:noFill/>
+          </a:ln>
+        </p:spPr>
+        <p:style>
+          <a:lnRef idx="2">
+            <a:schemeClr val="accent1">
+              <a:shade val="50000"/>
+            </a:schemeClr>
+          </a:lnRef>
+          <a:fillRef idx="1">
+            <a:schemeClr val="accent1"/>
+          </a:fillRef>
+          <a:effectRef idx="0">
+            <a:schemeClr val="accent1"/>
+          </a:effectRef>
+          <a:fontRef idx="minor">
+            <a:schemeClr val="lt1"/>
+          </a:fontRef>
+        </p:style>
+        <p:txBody>
+          <a:bodyPr rtlCol="0" anchor="ctr"/>
+          <a:lstStyle/>
+          <a:p>
+            <a:pPr marL="0" marR="0" lvl="0" indent="0" algn="ctr" defTabSz="914400" rtl="0" eaLnBrk="1" fontAlgn="auto" latinLnBrk="0" hangingPunct="1">
+              <a:lnSpc>
+                <a:spcPct val="100000"/>
+              </a:lnSpc>
+              <a:spcBef>
+                <a:spcPts val="0"/>
+              </a:spcBef>
+              <a:spcAft>
+                <a:spcPts val="0"/>
+              </a:spcAft>
+              <a:buClrTx/>
+              <a:buSzTx/>
+              <a:buFontTx/>
+              <a:buNone/>
+              <a:tabLst/>
+              <a:defRPr/>
+            </a:pPr>
+            <a:endParaRPr kumimoji="0" lang="en-US" sz="1800" b="0" i="0" u="none" strike="noStrike" kern="1200" cap="none" spc="0" normalizeH="0" baseline="0" noProof="0">
+              <a:ln>
+                <a:noFill/>
+              </a:ln>
+              <a:solidFill>
+                <a:prstClr val="white"/>
+              </a:solidFill>
+              <a:effectLst/>
+              <a:uLnTx/>
+              <a:uFillTx/>
+              <a:latin typeface="Aptos" panose="02110004020202020204"/>
+              <a:ea typeface="+mn-ea"/>
+              <a:cs typeface="+mn-cs"/>
+            </a:endParaRPr>
+          </a:p>
+        </p:txBody>
+      </p:sp>
+      <p:sp>
+        <p:nvSpPr>
+          <p:cNvPr id="25" name="Rectangle 24">
+            <a:extLst>
+              <a:ext uri="{FF2B5EF4-FFF2-40B4-BE49-F238E27FC236}">
+                <a16:creationId xmlns:a16="http://schemas.microsoft.com/office/drawing/2014/main" id="{A53CCC5C-D88E-40FB-B30B-23DCDBD01D37}"/>
+              </a:ext>
+              <a:ext uri="{C183D7F6-B498-43B3-948B-1728B52AA6E4}">
+                <adec:decorative xmlns:adec="http://schemas.microsoft.com/office/drawing/2017/decorative" val="1"/>
+              </a:ext>
+            </a:extLst>
+          </p:cNvPr>
+          <p:cNvSpPr>
+            <a:spLocks noGrp="1" noRot="1" noChangeAspect="1" noMove="1" noResize="1" noEditPoints="1" noAdjustHandles="1" noChangeArrowheads="1" noChangeShapeType="1" noTextEdit="1"/>
+          </p:cNvSpPr>
+          <p:nvPr>
+            <p:extLst>
+              <p:ext uri="{386F3935-93C4-4BCD-93E2-E3B085C9AB24}">
+                <p16:designElem xmlns:p16="http://schemas.microsoft.com/office/powerpoint/2015/main" val="1"/>
+              </p:ext>
+            </p:extLst>
+          </p:nvPr>
+        </p:nvSpPr>
+        <p:spPr>
+          <a:xfrm>
+            <a:off x="0" y="-4"/>
+            <a:ext cx="4167268" cy="6858004"/>
+          </a:xfrm>
+          <a:prstGeom prst="rect">
+            <a:avLst/>
+          </a:prstGeom>
+          <a:solidFill>
+            <a:schemeClr val="accent2"/>
+          </a:solidFill>
+          <a:ln>
+            <a:noFill/>
+          </a:ln>
+        </p:spPr>
+        <p:style>
+          <a:lnRef idx="2">
+            <a:schemeClr val="accent1">
+              <a:shade val="50000"/>
+            </a:schemeClr>
+          </a:lnRef>
+          <a:fillRef idx="1">
+            <a:schemeClr val="accent1"/>
+          </a:fillRef>
+          <a:effectRef idx="0">
+            <a:schemeClr val="accent1"/>
+          </a:effectRef>
+          <a:fontRef idx="minor">
+            <a:schemeClr val="lt1"/>
+          </a:fontRef>
+        </p:style>
+        <p:txBody>
+          <a:bodyPr rtlCol="0" anchor="ctr"/>
+          <a:lstStyle/>
+          <a:p>
+            <a:pPr marL="0" marR="0" lvl="0" indent="0" algn="ctr" defTabSz="914400" rtl="0" eaLnBrk="1" fontAlgn="auto" latinLnBrk="0" hangingPunct="1">
+              <a:lnSpc>
+                <a:spcPct val="100000"/>
+              </a:lnSpc>
+              <a:spcBef>
+                <a:spcPts val="0"/>
+              </a:spcBef>
+              <a:spcAft>
+                <a:spcPts val="0"/>
+              </a:spcAft>
+              <a:buClrTx/>
+              <a:buSzTx/>
+              <a:buFontTx/>
+              <a:buNone/>
+              <a:tabLst/>
+              <a:defRPr/>
+            </a:pPr>
+            <a:endParaRPr kumimoji="0" lang="en-US" sz="1800" b="0" i="0" u="none" strike="noStrike" kern="1200" cap="none" spc="0" normalizeH="0" baseline="0" noProof="0">
+              <a:ln>
+                <a:noFill/>
+              </a:ln>
+              <a:solidFill>
+                <a:prstClr val="white"/>
+              </a:solidFill>
+              <a:effectLst/>
+              <a:uLnTx/>
+              <a:uFillTx/>
+              <a:latin typeface="Aptos" panose="02110004020202020204"/>
+              <a:ea typeface="+mn-ea"/>
+              <a:cs typeface="+mn-cs"/>
+            </a:endParaRPr>
+          </a:p>
+        </p:txBody>
+      </p:sp>
+      <p:sp>
+        <p:nvSpPr>
+          <p:cNvPr id="26" name="Arc 25">
+            <a:extLst>
+              <a:ext uri="{FF2B5EF4-FFF2-40B4-BE49-F238E27FC236}">
+                <a16:creationId xmlns:a16="http://schemas.microsoft.com/office/drawing/2014/main" id="{081E4A58-353D-44AE-B2FC-2A74E2E400F7}"/>
+              </a:ext>
+              <a:ext uri="{C183D7F6-B498-43B3-948B-1728B52AA6E4}">
+                <adec:decorative xmlns:adec="http://schemas.microsoft.com/office/drawing/2017/decorative" val="1"/>
+              </a:ext>
+            </a:extLst>
+          </p:cNvPr>
+          <p:cNvSpPr>
+            <a:spLocks noGrp="1" noRot="1" noChangeAspect="1" noMove="1" noResize="1" noEditPoints="1" noAdjustHandles="1" noChangeArrowheads="1" noChangeShapeType="1" noTextEdit="1"/>
+          </p:cNvSpPr>
+          <p:nvPr>
+            <p:extLst>
+              <p:ext uri="{386F3935-93C4-4BCD-93E2-E3B085C9AB24}">
+                <p16:designElem xmlns:p16="http://schemas.microsoft.com/office/powerpoint/2015/main" val="1"/>
+              </p:ext>
+            </p:extLst>
+          </p:nvPr>
+        </p:nvSpPr>
+        <p:spPr>
+          <a:xfrm flipV="1">
+            <a:off x="7550402" y="2455479"/>
+            <a:ext cx="4083433" cy="4083433"/>
+          </a:xfrm>
+          <a:prstGeom prst="arc">
+            <a:avLst/>
+          </a:prstGeom>
+          <a:ln w="127000" cap="rnd">
+            <a:solidFill>
+              <a:schemeClr val="accent4"/>
+            </a:solidFill>
+            <a:prstDash val="dash"/>
+          </a:ln>
+        </p:spPr>
+        <p:style>
+          <a:lnRef idx="1">
+            <a:schemeClr val="accent1"/>
+          </a:lnRef>
+          <a:fillRef idx="0">
+            <a:schemeClr val="accent1"/>
+          </a:fillRef>
+          <a:effectRef idx="0">
+            <a:schemeClr val="accent1"/>
+          </a:effectRef>
+          <a:fontRef idx="minor">
+            <a:schemeClr val="tx1"/>
+          </a:fontRef>
+        </p:style>
+        <p:txBody>
+          <a:bodyPr rtlCol="0" anchor="ctr"/>
+          <a:lstStyle/>
+          <a:p>
+            <a:pPr marL="0" marR="0" lvl="0" indent="0" algn="ctr" defTabSz="914400" rtl="0" eaLnBrk="1" fontAlgn="auto" latinLnBrk="0" hangingPunct="1">
+              <a:lnSpc>
+                <a:spcPct val="100000"/>
+              </a:lnSpc>
+              <a:spcBef>
+                <a:spcPts val="0"/>
+              </a:spcBef>
+              <a:spcAft>
+                <a:spcPts val="0"/>
+              </a:spcAft>
+              <a:buClrTx/>
+              <a:buSzTx/>
+              <a:buFontTx/>
+              <a:buNone/>
+              <a:tabLst/>
+              <a:defRPr/>
+            </a:pPr>
+            <a:endParaRPr kumimoji="0" lang="en-US" sz="1800" b="0" i="0" u="none" strike="noStrike" kern="1200" cap="none" spc="0" normalizeH="0" baseline="0" noProof="0" dirty="0">
+              <a:ln>
+                <a:noFill/>
+              </a:ln>
+              <a:solidFill>
+                <a:prstClr val="black"/>
+              </a:solidFill>
+              <a:effectLst/>
+              <a:uLnTx/>
+              <a:uFillTx/>
+              <a:latin typeface="Aptos" panose="02110004020202020204"/>
+              <a:ea typeface="+mn-ea"/>
+              <a:cs typeface="+mn-cs"/>
+            </a:endParaRPr>
+          </a:p>
+        </p:txBody>
+      </p:sp>
+      <p:sp>
+        <p:nvSpPr>
+          <p:cNvPr id="3" name="Content Placeholder 2">
+            <a:extLst>
+              <a:ext uri="{FF2B5EF4-FFF2-40B4-BE49-F238E27FC236}">
+                <a16:creationId xmlns:a16="http://schemas.microsoft.com/office/drawing/2014/main" id="{354F4E26-D1F3-EC07-4782-463CFD06FAD1}"/>
+              </a:ext>
+            </a:extLst>
+          </p:cNvPr>
+          <p:cNvSpPr>
+            <a:spLocks noGrp="1"/>
+          </p:cNvSpPr>
+          <p:nvPr>
+            <p:ph idx="1"/>
+          </p:nvPr>
+        </p:nvSpPr>
+        <p:spPr>
+          <a:xfrm>
+            <a:off x="4447308" y="591344"/>
+            <a:ext cx="6906491" cy="5585619"/>
+          </a:xfrm>
+        </p:spPr>
+        <p:txBody>
+          <a:bodyPr anchor="ctr">
+            <a:normAutofit/>
+          </a:bodyPr>
+          <a:lstStyle/>
+          <a:p>
+            <a:pPr marL="0" indent="0">
+              <a:buNone/>
+            </a:pPr>
+            <a:r>
+              <a:rPr lang="en-US"/>
+              <a:t>Questions ?</a:t>
+            </a:r>
+          </a:p>
+        </p:txBody>
+      </p:sp>
+    </p:spTree>
+    <p:extLst>
+      <p:ext uri="{BB962C8B-B14F-4D97-AF65-F5344CB8AC3E}">
+        <p14:creationId xmlns:p14="http://schemas.microsoft.com/office/powerpoint/2010/main" val="1936368771"/>
+      </p:ext>
+    </p:extLst>
+  </p:cSld>
+  <p:clrMapOvr>
+    <a:masterClrMapping/>
+  </p:clrMapOvr>
+</p:sld>
+</file>
+
+<file path=ppt/slides/slide16.xml><?xml version="1.0" encoding="utf-8"?>
+<p:sld xmlns:a="http://schemas.openxmlformats.org/drawingml/2006/main" xmlns:r="http://schemas.openxmlformats.org/officeDocument/2006/relationships" xmlns:p="http://schemas.openxmlformats.org/presentationml/2006/main">
+  <p:cSld>
+    <p:bg>
+      <p:bgPr>
+        <a:solidFill>
+          <a:schemeClr val="bg1"/>
+        </a:solidFill>
+        <a:effectLst/>
+      </p:bgPr>
+    </p:bg>
+    <p:spTree>
+      <p:nvGrpSpPr>
+        <p:cNvPr id="1" name="">
+          <a:extLst>
+            <a:ext uri="{FF2B5EF4-FFF2-40B4-BE49-F238E27FC236}">
+              <a16:creationId xmlns:a16="http://schemas.microsoft.com/office/drawing/2014/main" id="{4A8299C4-A57F-F76F-A252-0BDFCC66E676}"/>
+            </a:ext>
+          </a:extLst>
+        </p:cNvPr>
+        <p:cNvGrpSpPr/>
+        <p:nvPr/>
+      </p:nvGrpSpPr>
+      <p:grpSpPr>
+        <a:xfrm>
+          <a:off x="0" y="0"/>
+          <a:ext cx="0" cy="0"/>
+          <a:chOff x="0" y="0"/>
+          <a:chExt cx="0" cy="0"/>
+        </a:xfrm>
+      </p:grpSpPr>
+      <p:sp useBgFill="1">
+        <p:nvSpPr>
+          <p:cNvPr id="24" name="Rectangle 23">
+            <a:extLst>
+              <a:ext uri="{FF2B5EF4-FFF2-40B4-BE49-F238E27FC236}">
+                <a16:creationId xmlns:a16="http://schemas.microsoft.com/office/drawing/2014/main" id="{D79EAD09-A52B-3F40-20A0-992FD5B02C2D}"/>
+              </a:ext>
+              <a:ext uri="{C183D7F6-B498-43B3-948B-1728B52AA6E4}">
+                <adec:decorative xmlns:adec="http://schemas.microsoft.com/office/drawing/2017/decorative" val="1"/>
+              </a:ext>
+            </a:extLst>
+          </p:cNvPr>
+          <p:cNvSpPr>
+            <a:spLocks noGrp="1" noRot="1" noChangeAspect="1" noMove="1" noResize="1" noEditPoints="1" noAdjustHandles="1" noChangeArrowheads="1" noChangeShapeType="1" noTextEdit="1"/>
+          </p:cNvSpPr>
+          <p:nvPr>
+            <p:extLst>
+              <p:ext uri="{386F3935-93C4-4BCD-93E2-E3B085C9AB24}">
+                <p16:designElem xmlns:p16="http://schemas.microsoft.com/office/powerpoint/2015/main" val="1"/>
+              </p:ext>
+            </p:extLst>
+          </p:nvPr>
+        </p:nvSpPr>
+        <p:spPr>
+          <a:xfrm>
+            <a:off x="3048" y="4293"/>
+            <a:ext cx="12188952" cy="6858000"/>
+          </a:xfrm>
+          <a:prstGeom prst="rect">
+            <a:avLst/>
+          </a:prstGeom>
+          <a:ln>
+            <a:noFill/>
+          </a:ln>
+        </p:spPr>
+        <p:style>
+          <a:lnRef idx="2">
+            <a:schemeClr val="accent1">
+              <a:shade val="50000"/>
+            </a:schemeClr>
+          </a:lnRef>
+          <a:fillRef idx="1">
+            <a:schemeClr val="accent1"/>
+          </a:fillRef>
+          <a:effectRef idx="0">
+            <a:schemeClr val="accent1"/>
+          </a:effectRef>
+          <a:fontRef idx="minor">
+            <a:schemeClr val="lt1"/>
+          </a:fontRef>
+        </p:style>
+        <p:txBody>
+          <a:bodyPr rtlCol="0" anchor="ctr"/>
+          <a:lstStyle/>
+          <a:p>
+            <a:pPr marL="0" marR="0" lvl="0" indent="0" algn="ctr" defTabSz="914400" rtl="0" eaLnBrk="1" fontAlgn="auto" latinLnBrk="0" hangingPunct="1">
+              <a:lnSpc>
+                <a:spcPct val="100000"/>
+              </a:lnSpc>
+              <a:spcBef>
+                <a:spcPts val="0"/>
+              </a:spcBef>
+              <a:spcAft>
+                <a:spcPts val="0"/>
+              </a:spcAft>
+              <a:buClrTx/>
+              <a:buSzTx/>
+              <a:buFontTx/>
+              <a:buNone/>
+              <a:tabLst/>
+              <a:defRPr/>
+            </a:pPr>
+            <a:endParaRPr kumimoji="0" lang="en-US" sz="1800" b="0" i="0" u="none" strike="noStrike" kern="1200" cap="none" spc="0" normalizeH="0" baseline="0" noProof="0">
+              <a:ln>
+                <a:noFill/>
+              </a:ln>
+              <a:solidFill>
+                <a:prstClr val="white"/>
+              </a:solidFill>
+              <a:effectLst/>
+              <a:uLnTx/>
+              <a:uFillTx/>
+              <a:latin typeface="Aptos" panose="02110004020202020204"/>
+              <a:ea typeface="+mn-ea"/>
+              <a:cs typeface="+mn-cs"/>
+            </a:endParaRPr>
+          </a:p>
+        </p:txBody>
+      </p:sp>
+      <p:sp>
+        <p:nvSpPr>
+          <p:cNvPr id="25" name="Rectangle 24">
+            <a:extLst>
+              <a:ext uri="{FF2B5EF4-FFF2-40B4-BE49-F238E27FC236}">
+                <a16:creationId xmlns:a16="http://schemas.microsoft.com/office/drawing/2014/main" id="{E3C6766D-7230-6D6A-2178-AFEA6D3E8834}"/>
+              </a:ext>
+              <a:ext uri="{C183D7F6-B498-43B3-948B-1728B52AA6E4}">
+                <adec:decorative xmlns:adec="http://schemas.microsoft.com/office/drawing/2017/decorative" val="1"/>
+              </a:ext>
+            </a:extLst>
+          </p:cNvPr>
+          <p:cNvSpPr>
+            <a:spLocks noGrp="1" noRot="1" noChangeAspect="1" noMove="1" noResize="1" noEditPoints="1" noAdjustHandles="1" noChangeArrowheads="1" noChangeShapeType="1" noTextEdit="1"/>
+          </p:cNvSpPr>
+          <p:nvPr>
+            <p:extLst>
+              <p:ext uri="{386F3935-93C4-4BCD-93E2-E3B085C9AB24}">
+                <p16:designElem xmlns:p16="http://schemas.microsoft.com/office/powerpoint/2015/main" val="1"/>
+              </p:ext>
+            </p:extLst>
+          </p:nvPr>
+        </p:nvSpPr>
+        <p:spPr>
+          <a:xfrm>
+            <a:off x="0" y="-4"/>
+            <a:ext cx="4167268" cy="6858004"/>
+          </a:xfrm>
+          <a:prstGeom prst="rect">
+            <a:avLst/>
+          </a:prstGeom>
+          <a:solidFill>
+            <a:schemeClr val="accent2"/>
+          </a:solidFill>
+          <a:ln>
+            <a:noFill/>
+          </a:ln>
+        </p:spPr>
+        <p:style>
+          <a:lnRef idx="2">
+            <a:schemeClr val="accent1">
+              <a:shade val="50000"/>
+            </a:schemeClr>
+          </a:lnRef>
+          <a:fillRef idx="1">
+            <a:schemeClr val="accent1"/>
+          </a:fillRef>
+          <a:effectRef idx="0">
+            <a:schemeClr val="accent1"/>
+          </a:effectRef>
+          <a:fontRef idx="minor">
+            <a:schemeClr val="lt1"/>
+          </a:fontRef>
+        </p:style>
+        <p:txBody>
+          <a:bodyPr rtlCol="0" anchor="ctr"/>
+          <a:lstStyle/>
+          <a:p>
+            <a:pPr marL="0" marR="0" lvl="0" indent="0" algn="ctr" defTabSz="914400" rtl="0" eaLnBrk="1" fontAlgn="auto" latinLnBrk="0" hangingPunct="1">
+              <a:lnSpc>
+                <a:spcPct val="100000"/>
+              </a:lnSpc>
+              <a:spcBef>
+                <a:spcPts val="0"/>
+              </a:spcBef>
+              <a:spcAft>
+                <a:spcPts val="0"/>
+              </a:spcAft>
+              <a:buClrTx/>
+              <a:buSzTx/>
+              <a:buFontTx/>
+              <a:buNone/>
+              <a:tabLst/>
+              <a:defRPr/>
+            </a:pPr>
+            <a:endParaRPr kumimoji="0" lang="en-US" sz="1800" b="0" i="0" u="none" strike="noStrike" kern="1200" cap="none" spc="0" normalizeH="0" baseline="0" noProof="0">
+              <a:ln>
+                <a:noFill/>
+              </a:ln>
+              <a:solidFill>
+                <a:prstClr val="white"/>
+              </a:solidFill>
+              <a:effectLst/>
+              <a:uLnTx/>
+              <a:uFillTx/>
+              <a:latin typeface="Aptos" panose="02110004020202020204"/>
+              <a:ea typeface="+mn-ea"/>
+              <a:cs typeface="+mn-cs"/>
+            </a:endParaRPr>
+          </a:p>
+        </p:txBody>
+      </p:sp>
+      <p:sp>
+        <p:nvSpPr>
+          <p:cNvPr id="26" name="Arc 25">
+            <a:extLst>
+              <a:ext uri="{FF2B5EF4-FFF2-40B4-BE49-F238E27FC236}">
+                <a16:creationId xmlns:a16="http://schemas.microsoft.com/office/drawing/2014/main" id="{7098CF42-3639-BD0B-AB92-5E94C9F7FB6D}"/>
+              </a:ext>
+              <a:ext uri="{C183D7F6-B498-43B3-948B-1728B52AA6E4}">
+                <adec:decorative xmlns:adec="http://schemas.microsoft.com/office/drawing/2017/decorative" val="1"/>
+              </a:ext>
+            </a:extLst>
+          </p:cNvPr>
+          <p:cNvSpPr>
+            <a:spLocks noGrp="1" noRot="1" noChangeAspect="1" noMove="1" noResize="1" noEditPoints="1" noAdjustHandles="1" noChangeArrowheads="1" noChangeShapeType="1" noTextEdit="1"/>
+          </p:cNvSpPr>
+          <p:nvPr>
+            <p:extLst>
+              <p:ext uri="{386F3935-93C4-4BCD-93E2-E3B085C9AB24}">
+                <p16:designElem xmlns:p16="http://schemas.microsoft.com/office/powerpoint/2015/main" val="1"/>
+              </p:ext>
+            </p:extLst>
+          </p:nvPr>
+        </p:nvSpPr>
+        <p:spPr>
+          <a:xfrm flipV="1">
+            <a:off x="7550402" y="2455479"/>
+            <a:ext cx="4083433" cy="4083433"/>
+          </a:xfrm>
+          <a:prstGeom prst="arc">
+            <a:avLst/>
+          </a:prstGeom>
+          <a:ln w="127000" cap="rnd">
+            <a:solidFill>
+              <a:schemeClr val="accent4"/>
+            </a:solidFill>
+            <a:prstDash val="dash"/>
+          </a:ln>
+        </p:spPr>
+        <p:style>
+          <a:lnRef idx="1">
+            <a:schemeClr val="accent1"/>
+          </a:lnRef>
+          <a:fillRef idx="0">
+            <a:schemeClr val="accent1"/>
+          </a:fillRef>
+          <a:effectRef idx="0">
+            <a:schemeClr val="accent1"/>
+          </a:effectRef>
+          <a:fontRef idx="minor">
+            <a:schemeClr val="tx1"/>
+          </a:fontRef>
+        </p:style>
+        <p:txBody>
+          <a:bodyPr rtlCol="0" anchor="ctr"/>
+          <a:lstStyle/>
+          <a:p>
+            <a:pPr marL="0" marR="0" lvl="0" indent="0" algn="ctr" defTabSz="914400" rtl="0" eaLnBrk="1" fontAlgn="auto" latinLnBrk="0" hangingPunct="1">
+              <a:lnSpc>
+                <a:spcPct val="100000"/>
+              </a:lnSpc>
+              <a:spcBef>
+                <a:spcPts val="0"/>
+              </a:spcBef>
+              <a:spcAft>
+                <a:spcPts val="0"/>
+              </a:spcAft>
+              <a:buClrTx/>
+              <a:buSzTx/>
+              <a:buFontTx/>
+              <a:buNone/>
+              <a:tabLst/>
+              <a:defRPr/>
+            </a:pPr>
+            <a:endParaRPr kumimoji="0" lang="en-US" sz="1800" b="0" i="0" u="none" strike="noStrike" kern="1200" cap="none" spc="0" normalizeH="0" baseline="0" noProof="0" dirty="0">
+              <a:ln>
+                <a:noFill/>
+              </a:ln>
+              <a:solidFill>
+                <a:prstClr val="black"/>
+              </a:solidFill>
+              <a:effectLst/>
+              <a:uLnTx/>
+              <a:uFillTx/>
+              <a:latin typeface="Aptos" panose="02110004020202020204"/>
+              <a:ea typeface="+mn-ea"/>
+              <a:cs typeface="+mn-cs"/>
+            </a:endParaRPr>
+          </a:p>
+        </p:txBody>
+      </p:sp>
+      <p:sp>
+        <p:nvSpPr>
+          <p:cNvPr id="3" name="Content Placeholder 2">
+            <a:extLst>
+              <a:ext uri="{FF2B5EF4-FFF2-40B4-BE49-F238E27FC236}">
+                <a16:creationId xmlns:a16="http://schemas.microsoft.com/office/drawing/2014/main" id="{19BE6953-44A8-E351-F8C5-9B2D6522B55D}"/>
+              </a:ext>
+            </a:extLst>
+          </p:cNvPr>
+          <p:cNvSpPr>
+            <a:spLocks noGrp="1"/>
+          </p:cNvSpPr>
+          <p:nvPr>
+            <p:ph idx="1"/>
+          </p:nvPr>
+        </p:nvSpPr>
+        <p:spPr>
+          <a:xfrm>
+            <a:off x="4447308" y="591344"/>
+            <a:ext cx="6906491" cy="5585619"/>
+          </a:xfrm>
+        </p:spPr>
+        <p:txBody>
+          <a:bodyPr anchor="ctr">
+            <a:normAutofit/>
+          </a:bodyPr>
+          <a:lstStyle/>
+          <a:p>
+            <a:pPr marL="0" indent="0">
+              <a:buNone/>
+            </a:pPr>
+            <a:r>
+              <a:rPr lang="en-US" dirty="0"/>
+              <a:t>Thank you</a:t>
+            </a:r>
+          </a:p>
+        </p:txBody>
+      </p:sp>
+    </p:spTree>
+    <p:extLst>
+      <p:ext uri="{BB962C8B-B14F-4D97-AF65-F5344CB8AC3E}">
+        <p14:creationId xmlns:p14="http://schemas.microsoft.com/office/powerpoint/2010/main" val="1409184322"/>
       </p:ext>
     </p:extLst>
   </p:cSld>

</xml_diff>

<commit_message>
Adding topics to Networking
</commit_message>
<xml_diff>
--- a/AKS_01_Core_and_Setup.pptx
+++ b/AKS_01_Core_and_Setup.pptx
@@ -6,7 +6,7 @@
     <p:sldMasterId id="2147483660" r:id="rId2"/>
   </p:sldMasterIdLst>
   <p:notesMasterIdLst>
-    <p:notesMasterId r:id="rId37"/>
+    <p:notesMasterId r:id="rId38"/>
   </p:notesMasterIdLst>
   <p:sldIdLst>
     <p:sldId id="256" r:id="rId3"/>
@@ -39,10 +39,11 @@
     <p:sldId id="352" r:id="rId30"/>
     <p:sldId id="349" r:id="rId31"/>
     <p:sldId id="351" r:id="rId32"/>
-    <p:sldId id="353" r:id="rId33"/>
-    <p:sldId id="354" r:id="rId34"/>
-    <p:sldId id="334" r:id="rId35"/>
-    <p:sldId id="335" r:id="rId36"/>
+    <p:sldId id="355" r:id="rId33"/>
+    <p:sldId id="353" r:id="rId34"/>
+    <p:sldId id="354" r:id="rId35"/>
+    <p:sldId id="334" r:id="rId36"/>
+    <p:sldId id="335" r:id="rId37"/>
   </p:sldIdLst>
   <p:sldSz cx="12192000" cy="6858000"/>
   <p:notesSz cx="6858000" cy="9144000"/>
@@ -162,7 +163,7 @@
   <pc:docChgLst>
     <pc:chgData name="faik bilgen" userId="9fcb1696e65a161f" providerId="LiveId" clId="{0C3A4C9E-717D-4ADE-97E0-B0AD580B3355}"/>
     <pc:docChg chg="undo custSel addSld delSld modSld sldOrd">
-      <pc:chgData name="faik bilgen" userId="9fcb1696e65a161f" providerId="LiveId" clId="{0C3A4C9E-717D-4ADE-97E0-B0AD580B3355}" dt="2026-02-01T10:58:47.516" v="712" actId="20577"/>
+      <pc:chgData name="faik bilgen" userId="9fcb1696e65a161f" providerId="LiveId" clId="{0C3A4C9E-717D-4ADE-97E0-B0AD580B3355}" dt="2026-02-03T05:55:33.579" v="739" actId="1076"/>
       <pc:docMkLst>
         <pc:docMk/>
       </pc:docMkLst>
@@ -439,22 +440,6 @@
             <ac:spMk id="5" creationId="{4DE0D579-EC61-A3F4-627F-5439D007A6C8}"/>
           </ac:spMkLst>
         </pc:spChg>
-        <pc:spChg chg="del">
-          <ac:chgData name="faik bilgen" userId="9fcb1696e65a161f" providerId="LiveId" clId="{0C3A4C9E-717D-4ADE-97E0-B0AD580B3355}" dt="2026-01-31T08:28:59.855" v="284" actId="478"/>
-          <ac:spMkLst>
-            <pc:docMk/>
-            <pc:sldMk cId="4108679304" sldId="343"/>
-            <ac:spMk id="7" creationId="{2AE261CC-4A04-95C3-2E93-D2F800432B26}"/>
-          </ac:spMkLst>
-        </pc:spChg>
-        <pc:picChg chg="del">
-          <ac:chgData name="faik bilgen" userId="9fcb1696e65a161f" providerId="LiveId" clId="{0C3A4C9E-717D-4ADE-97E0-B0AD580B3355}" dt="2026-01-31T08:27:16.984" v="283" actId="478"/>
-          <ac:picMkLst>
-            <pc:docMk/>
-            <pc:sldMk cId="4108679304" sldId="343"/>
-            <ac:picMk id="4" creationId="{D057DF22-D7E6-21A1-0960-1D0F8A587718}"/>
-          </ac:picMkLst>
-        </pc:picChg>
       </pc:sldChg>
       <pc:sldChg chg="modSp add mod">
         <pc:chgData name="faik bilgen" userId="9fcb1696e65a161f" providerId="LiveId" clId="{0C3A4C9E-717D-4ADE-97E0-B0AD580B3355}" dt="2026-01-31T08:34:42.143" v="296" actId="948"/>
@@ -493,14 +478,6 @@
             <ac:spMk id="2" creationId="{793378AE-8FCE-A5A8-DD35-4D06D33F93C6}"/>
           </ac:spMkLst>
         </pc:spChg>
-        <pc:spChg chg="del">
-          <ac:chgData name="faik bilgen" userId="9fcb1696e65a161f" providerId="LiveId" clId="{0C3A4C9E-717D-4ADE-97E0-B0AD580B3355}" dt="2026-01-31T09:48:48.934" v="352" actId="478"/>
-          <ac:spMkLst>
-            <pc:docMk/>
-            <pc:sldMk cId="1205914751" sldId="345"/>
-            <ac:spMk id="5" creationId="{8374A8BF-48C5-1429-069C-2FF2E022D7DD}"/>
-          </ac:spMkLst>
-        </pc:spChg>
         <pc:spChg chg="add mod">
           <ac:chgData name="faik bilgen" userId="9fcb1696e65a161f" providerId="LiveId" clId="{0C3A4C9E-717D-4ADE-97E0-B0AD580B3355}" dt="2026-01-31T14:52:36.746" v="378" actId="1076"/>
           <ac:spMkLst>
@@ -509,22 +486,6 @@
             <ac:spMk id="6" creationId="{744641AD-F4F1-55EA-C035-7656B4F0E109}"/>
           </ac:spMkLst>
         </pc:spChg>
-        <pc:spChg chg="del">
-          <ac:chgData name="faik bilgen" userId="9fcb1696e65a161f" providerId="LiveId" clId="{0C3A4C9E-717D-4ADE-97E0-B0AD580B3355}" dt="2026-01-31T09:48:56.647" v="354" actId="478"/>
-          <ac:spMkLst>
-            <pc:docMk/>
-            <pc:sldMk cId="1205914751" sldId="345"/>
-            <ac:spMk id="7" creationId="{0C64DC80-3124-37F1-754A-4EB78C65D5B8}"/>
-          </ac:spMkLst>
-        </pc:spChg>
-        <pc:picChg chg="del">
-          <ac:chgData name="faik bilgen" userId="9fcb1696e65a161f" providerId="LiveId" clId="{0C3A4C9E-717D-4ADE-97E0-B0AD580B3355}" dt="2026-01-31T09:48:50.997" v="353" actId="478"/>
-          <ac:picMkLst>
-            <pc:docMk/>
-            <pc:sldMk cId="1205914751" sldId="345"/>
-            <ac:picMk id="4" creationId="{6A7A81B5-318A-0360-9D87-43BA9234B8B6}"/>
-          </ac:picMkLst>
-        </pc:picChg>
       </pc:sldChg>
       <pc:sldChg chg="modSp add mod ord">
         <pc:chgData name="faik bilgen" userId="9fcb1696e65a161f" providerId="LiveId" clId="{0C3A4C9E-717D-4ADE-97E0-B0AD580B3355}" dt="2026-01-31T11:06:36.104" v="377" actId="20577"/>
@@ -585,14 +546,6 @@
             <ac:spMk id="2" creationId="{D15BFB10-3DBF-59C4-D00A-EB86F813C9ED}"/>
           </ac:spMkLst>
         </pc:spChg>
-        <pc:spChg chg="del">
-          <ac:chgData name="faik bilgen" userId="9fcb1696e65a161f" providerId="LiveId" clId="{0C3A4C9E-717D-4ADE-97E0-B0AD580B3355}" dt="2026-02-01T07:01:00.015" v="435" actId="478"/>
-          <ac:spMkLst>
-            <pc:docMk/>
-            <pc:sldMk cId="2326988816" sldId="349"/>
-            <ac:spMk id="5" creationId="{DB7B4A95-EA98-0F7B-E67E-1ED6AB6ADDDD}"/>
-          </ac:spMkLst>
-        </pc:spChg>
         <pc:spChg chg="add mod">
           <ac:chgData name="faik bilgen" userId="9fcb1696e65a161f" providerId="LiveId" clId="{0C3A4C9E-717D-4ADE-97E0-B0AD580B3355}" dt="2026-02-01T08:20:58.286" v="462" actId="1076"/>
           <ac:spMkLst>
@@ -601,69 +554,6 @@
             <ac:spMk id="6" creationId="{EB11C1C7-5D14-8EAF-7FB0-670E96943187}"/>
           </ac:spMkLst>
         </pc:spChg>
-        <pc:spChg chg="del">
-          <ac:chgData name="faik bilgen" userId="9fcb1696e65a161f" providerId="LiveId" clId="{0C3A4C9E-717D-4ADE-97E0-B0AD580B3355}" dt="2026-02-01T07:01:04.595" v="437" actId="478"/>
-          <ac:spMkLst>
-            <pc:docMk/>
-            <pc:sldMk cId="2326988816" sldId="349"/>
-            <ac:spMk id="7" creationId="{AC34352A-CF72-4D35-3CF6-7C11B3C1EB9C}"/>
-          </ac:spMkLst>
-        </pc:spChg>
-        <pc:picChg chg="del">
-          <ac:chgData name="faik bilgen" userId="9fcb1696e65a161f" providerId="LiveId" clId="{0C3A4C9E-717D-4ADE-97E0-B0AD580B3355}" dt="2026-02-01T07:01:01.982" v="436" actId="478"/>
-          <ac:picMkLst>
-            <pc:docMk/>
-            <pc:sldMk cId="2326988816" sldId="349"/>
-            <ac:picMk id="4" creationId="{175EE362-1124-D6F7-A6C0-665897FAD07A}"/>
-          </ac:picMkLst>
-        </pc:picChg>
-      </pc:sldChg>
-      <pc:sldChg chg="addSp delSp modSp add del mod">
-        <pc:chgData name="faik bilgen" userId="9fcb1696e65a161f" providerId="LiveId" clId="{0C3A4C9E-717D-4ADE-97E0-B0AD580B3355}" dt="2026-02-01T08:29:37.549" v="629" actId="47"/>
-        <pc:sldMkLst>
-          <pc:docMk/>
-          <pc:sldMk cId="796235026" sldId="350"/>
-        </pc:sldMkLst>
-        <pc:spChg chg="del">
-          <ac:chgData name="faik bilgen" userId="9fcb1696e65a161f" providerId="LiveId" clId="{0C3A4C9E-717D-4ADE-97E0-B0AD580B3355}" dt="2026-02-01T08:22:43.377" v="464" actId="478"/>
-          <ac:spMkLst>
-            <pc:docMk/>
-            <pc:sldMk cId="796235026" sldId="350"/>
-            <ac:spMk id="6" creationId="{C034CAEF-5F92-8CAC-A419-FB0D8E22DB18}"/>
-          </ac:spMkLst>
-        </pc:spChg>
-        <pc:spChg chg="add mod">
-          <ac:chgData name="faik bilgen" userId="9fcb1696e65a161f" providerId="LiveId" clId="{0C3A4C9E-717D-4ADE-97E0-B0AD580B3355}" dt="2026-02-01T08:25:29.585" v="606" actId="1036"/>
-          <ac:spMkLst>
-            <pc:docMk/>
-            <pc:sldMk cId="796235026" sldId="350"/>
-            <ac:spMk id="8" creationId="{4D2653A2-2280-0321-6EFB-8F41DFD36482}"/>
-          </ac:spMkLst>
-        </pc:spChg>
-        <pc:spChg chg="add mod">
-          <ac:chgData name="faik bilgen" userId="9fcb1696e65a161f" providerId="LiveId" clId="{0C3A4C9E-717D-4ADE-97E0-B0AD580B3355}" dt="2026-02-01T08:25:29.585" v="606" actId="1036"/>
-          <ac:spMkLst>
-            <pc:docMk/>
-            <pc:sldMk cId="796235026" sldId="350"/>
-            <ac:spMk id="9" creationId="{68ACB9C4-3EAA-73F9-FAAD-4C95FFB7DFC1}"/>
-          </ac:spMkLst>
-        </pc:spChg>
-        <pc:picChg chg="add mod">
-          <ac:chgData name="faik bilgen" userId="9fcb1696e65a161f" providerId="LiveId" clId="{0C3A4C9E-717D-4ADE-97E0-B0AD580B3355}" dt="2026-02-01T08:25:29.585" v="606" actId="1036"/>
-          <ac:picMkLst>
-            <pc:docMk/>
-            <pc:sldMk cId="796235026" sldId="350"/>
-            <ac:picMk id="4" creationId="{0B4EAACB-65DD-4E1F-EF9E-93F0CCE2383C}"/>
-          </ac:picMkLst>
-        </pc:picChg>
-        <pc:picChg chg="add mod">
-          <ac:chgData name="faik bilgen" userId="9fcb1696e65a161f" providerId="LiveId" clId="{0C3A4C9E-717D-4ADE-97E0-B0AD580B3355}" dt="2026-02-01T08:25:29.585" v="606" actId="1036"/>
-          <ac:picMkLst>
-            <pc:docMk/>
-            <pc:sldMk cId="796235026" sldId="350"/>
-            <ac:picMk id="7" creationId="{2E32E4A0-B5BC-E940-E47D-5F2CA8152805}"/>
-          </ac:picMkLst>
-        </pc:picChg>
       </pc:sldChg>
       <pc:sldChg chg="addSp delSp modSp new mod modNotesTx">
         <pc:chgData name="faik bilgen" userId="9fcb1696e65a161f" providerId="LiveId" clId="{0C3A4C9E-717D-4ADE-97E0-B0AD580B3355}" dt="2026-02-01T08:35:02.925" v="655" actId="14100"/>
@@ -677,14 +567,6 @@
             <pc:docMk/>
             <pc:sldMk cId="1116948988" sldId="351"/>
             <ac:spMk id="2" creationId="{4250DB7B-7DB4-A2A4-D66B-86E26005FB6C}"/>
-          </ac:spMkLst>
-        </pc:spChg>
-        <pc:spChg chg="del">
-          <ac:chgData name="faik bilgen" userId="9fcb1696e65a161f" providerId="LiveId" clId="{0C3A4C9E-717D-4ADE-97E0-B0AD580B3355}" dt="2026-02-01T08:26:49.063" v="609" actId="478"/>
-          <ac:spMkLst>
-            <pc:docMk/>
-            <pc:sldMk cId="1116948988" sldId="351"/>
-            <ac:spMk id="3" creationId="{CBE362DA-E776-0092-B0A9-BDACBCECB230}"/>
           </ac:spMkLst>
         </pc:spChg>
         <pc:spChg chg="add mod">
@@ -703,36 +585,12 @@
             <ac:spMk id="7" creationId="{C6A69569-8063-2D37-C82F-5B9A541D294B}"/>
           </ac:spMkLst>
         </pc:spChg>
-        <pc:picChg chg="add del mod">
-          <ac:chgData name="faik bilgen" userId="9fcb1696e65a161f" providerId="LiveId" clId="{0C3A4C9E-717D-4ADE-97E0-B0AD580B3355}" dt="2026-02-01T08:27:40.781" v="612" actId="478"/>
-          <ac:picMkLst>
-            <pc:docMk/>
-            <pc:sldMk cId="1116948988" sldId="351"/>
-            <ac:picMk id="4" creationId="{FE842C67-DC3C-D576-0076-4B9EDF50051F}"/>
-          </ac:picMkLst>
-        </pc:picChg>
-        <pc:picChg chg="add del mod">
-          <ac:chgData name="faik bilgen" userId="9fcb1696e65a161f" providerId="LiveId" clId="{0C3A4C9E-717D-4ADE-97E0-B0AD580B3355}" dt="2026-02-01T08:27:40.781" v="612" actId="478"/>
-          <ac:picMkLst>
-            <pc:docMk/>
-            <pc:sldMk cId="1116948988" sldId="351"/>
-            <ac:picMk id="5" creationId="{49BC1678-A709-392C-1AA0-852CBE21DECC}"/>
-          </ac:picMkLst>
-        </pc:picChg>
         <pc:picChg chg="add mod">
           <ac:chgData name="faik bilgen" userId="9fcb1696e65a161f" providerId="LiveId" clId="{0C3A4C9E-717D-4ADE-97E0-B0AD580B3355}" dt="2026-02-01T08:29:46.569" v="643" actId="1036"/>
           <ac:picMkLst>
             <pc:docMk/>
             <pc:sldMk cId="1116948988" sldId="351"/>
             <ac:picMk id="9" creationId="{121BF72B-A80D-5CE5-FF7E-30015C5A1941}"/>
-          </ac:picMkLst>
-        </pc:picChg>
-        <pc:picChg chg="add del mod">
-          <ac:chgData name="faik bilgen" userId="9fcb1696e65a161f" providerId="LiveId" clId="{0C3A4C9E-717D-4ADE-97E0-B0AD580B3355}" dt="2026-02-01T08:34:43.690" v="650" actId="478"/>
-          <ac:picMkLst>
-            <pc:docMk/>
-            <pc:sldMk cId="1116948988" sldId="351"/>
-            <ac:picMk id="11" creationId="{881848FA-DB5D-0825-2E91-7B919CDB2B2D}"/>
           </ac:picMkLst>
         </pc:picChg>
         <pc:picChg chg="add mod">
@@ -750,14 +608,6 @@
           <pc:docMk/>
           <pc:sldMk cId="3353774774" sldId="352"/>
         </pc:sldMkLst>
-        <pc:spChg chg="del">
-          <ac:chgData name="faik bilgen" userId="9fcb1696e65a161f" providerId="LiveId" clId="{0C3A4C9E-717D-4ADE-97E0-B0AD580B3355}" dt="2026-02-01T10:57:01.690" v="657" actId="478"/>
-          <ac:spMkLst>
-            <pc:docMk/>
-            <pc:sldMk cId="3353774774" sldId="352"/>
-            <ac:spMk id="6" creationId="{A9F56FF8-38F4-F28E-F0F5-10DFE96F2B77}"/>
-          </ac:spMkLst>
-        </pc:spChg>
         <pc:picChg chg="add mod">
           <ac:chgData name="faik bilgen" userId="9fcb1696e65a161f" providerId="LiveId" clId="{0C3A4C9E-717D-4ADE-97E0-B0AD580B3355}" dt="2026-02-01T10:57:07.830" v="659" actId="1076"/>
           <ac:picMkLst>
@@ -796,6 +646,45 @@
             <ac:spMk id="3" creationId="{19D6F6E5-3DE3-14B1-716A-EAACA99BBBDB}"/>
           </ac:spMkLst>
         </pc:spChg>
+      </pc:sldChg>
+      <pc:sldChg chg="addSp delSp modSp add mod">
+        <pc:chgData name="faik bilgen" userId="9fcb1696e65a161f" providerId="LiveId" clId="{0C3A4C9E-717D-4ADE-97E0-B0AD580B3355}" dt="2026-02-03T05:55:33.579" v="739" actId="1076"/>
+        <pc:sldMkLst>
+          <pc:docMk/>
+          <pc:sldMk cId="598411799" sldId="355"/>
+        </pc:sldMkLst>
+        <pc:spChg chg="add mod">
+          <ac:chgData name="faik bilgen" userId="9fcb1696e65a161f" providerId="LiveId" clId="{0C3A4C9E-717D-4ADE-97E0-B0AD580B3355}" dt="2026-02-01T12:26:12.323" v="722" actId="1582"/>
+          <ac:spMkLst>
+            <pc:docMk/>
+            <pc:sldMk cId="598411799" sldId="355"/>
+            <ac:spMk id="5" creationId="{34CEEA30-4F30-3A6E-8EBE-6FA7DE09DE62}"/>
+          </ac:spMkLst>
+        </pc:spChg>
+        <pc:spChg chg="add mod">
+          <ac:chgData name="faik bilgen" userId="9fcb1696e65a161f" providerId="LiveId" clId="{0C3A4C9E-717D-4ADE-97E0-B0AD580B3355}" dt="2026-02-03T05:19:51.781" v="738" actId="14100"/>
+          <ac:spMkLst>
+            <pc:docMk/>
+            <pc:sldMk cId="598411799" sldId="355"/>
+            <ac:spMk id="9" creationId="{112AF880-7FB9-8835-23A6-A9B3D1FC6A3A}"/>
+          </ac:spMkLst>
+        </pc:spChg>
+        <pc:picChg chg="add mod">
+          <ac:chgData name="faik bilgen" userId="9fcb1696e65a161f" providerId="LiveId" clId="{0C3A4C9E-717D-4ADE-97E0-B0AD580B3355}" dt="2026-02-01T12:25:38.085" v="718" actId="14100"/>
+          <ac:picMkLst>
+            <pc:docMk/>
+            <pc:sldMk cId="598411799" sldId="355"/>
+            <ac:picMk id="4" creationId="{255FF1FD-7E43-9ABF-8AED-2BFCB1B32DAA}"/>
+          </ac:picMkLst>
+        </pc:picChg>
+        <pc:picChg chg="add mod">
+          <ac:chgData name="faik bilgen" userId="9fcb1696e65a161f" providerId="LiveId" clId="{0C3A4C9E-717D-4ADE-97E0-B0AD580B3355}" dt="2026-02-03T05:55:33.579" v="739" actId="1076"/>
+          <ac:picMkLst>
+            <pc:docMk/>
+            <pc:sldMk cId="598411799" sldId="355"/>
+            <ac:picMk id="8" creationId="{6513F218-2616-A8EB-2841-5820810BA314}"/>
+          </ac:picMkLst>
+        </pc:picChg>
       </pc:sldChg>
     </pc:docChg>
   </pc:docChgLst>
@@ -884,7 +773,7 @@
           <a:p>
             <a:fld id="{BB3ADA56-F335-42A3-B626-59F513015A5C}" type="datetimeFigureOut">
               <a:rPr lang="en-US" smtClean="0"/>
-              <a:t>2/1/2026</a:t>
+              <a:t>2/3/2026</a:t>
             </a:fld>
             <a:endParaRPr lang="en-US"/>
           </a:p>
@@ -1611,6 +1500,117 @@
 </p:notes>
 </file>
 
+<file path=ppt/notesSlides/notesSlide6.xml><?xml version="1.0" encoding="utf-8"?>
+<p:notes xmlns:a="http://schemas.openxmlformats.org/drawingml/2006/main" xmlns:r="http://schemas.openxmlformats.org/officeDocument/2006/relationships" xmlns:p="http://schemas.openxmlformats.org/presentationml/2006/main">
+  <p:cSld>
+    <p:spTree>
+      <p:nvGrpSpPr>
+        <p:cNvPr id="1" name="">
+          <a:extLst>
+            <a:ext uri="{FF2B5EF4-FFF2-40B4-BE49-F238E27FC236}">
+              <a16:creationId xmlns:a16="http://schemas.microsoft.com/office/drawing/2014/main" id="{0D7A7A90-E13F-8B9C-32F9-E7163AEC3219}"/>
+            </a:ext>
+          </a:extLst>
+        </p:cNvPr>
+        <p:cNvGrpSpPr/>
+        <p:nvPr/>
+      </p:nvGrpSpPr>
+      <p:grpSpPr>
+        <a:xfrm>
+          <a:off x="0" y="0"/>
+          <a:ext cx="0" cy="0"/>
+          <a:chOff x="0" y="0"/>
+          <a:chExt cx="0" cy="0"/>
+        </a:xfrm>
+      </p:grpSpPr>
+      <p:sp>
+        <p:nvSpPr>
+          <p:cNvPr id="2" name="Slide Image Placeholder 1">
+            <a:extLst>
+              <a:ext uri="{FF2B5EF4-FFF2-40B4-BE49-F238E27FC236}">
+                <a16:creationId xmlns:a16="http://schemas.microsoft.com/office/drawing/2014/main" id="{F4F31702-C8D9-18C3-7DFC-F763F3B1B00F}"/>
+              </a:ext>
+            </a:extLst>
+          </p:cNvPr>
+          <p:cNvSpPr>
+            <a:spLocks noGrp="1" noRot="1" noChangeAspect="1"/>
+          </p:cNvSpPr>
+          <p:nvPr>
+            <p:ph type="sldImg"/>
+          </p:nvPr>
+        </p:nvSpPr>
+        <p:spPr/>
+      </p:sp>
+      <p:sp>
+        <p:nvSpPr>
+          <p:cNvPr id="3" name="Notes Placeholder 2">
+            <a:extLst>
+              <a:ext uri="{FF2B5EF4-FFF2-40B4-BE49-F238E27FC236}">
+                <a16:creationId xmlns:a16="http://schemas.microsoft.com/office/drawing/2014/main" id="{81464B53-5E1E-B6CF-F3E6-B11E53B3275D}"/>
+              </a:ext>
+            </a:extLst>
+          </p:cNvPr>
+          <p:cNvSpPr>
+            <a:spLocks noGrp="1"/>
+          </p:cNvSpPr>
+          <p:nvPr>
+            <p:ph type="body" idx="1"/>
+          </p:nvPr>
+        </p:nvSpPr>
+        <p:spPr/>
+        <p:txBody>
+          <a:bodyPr/>
+          <a:lstStyle/>
+          <a:p>
+            <a:r>
+              <a:rPr lang="en-US" dirty="0"/>
+              <a:t>https://learn.microsoft.com/en-us/azure/aks/private-clusters </a:t>
+            </a:r>
+          </a:p>
+        </p:txBody>
+      </p:sp>
+      <p:sp>
+        <p:nvSpPr>
+          <p:cNvPr id="4" name="Slide Number Placeholder 3">
+            <a:extLst>
+              <a:ext uri="{FF2B5EF4-FFF2-40B4-BE49-F238E27FC236}">
+                <a16:creationId xmlns:a16="http://schemas.microsoft.com/office/drawing/2014/main" id="{F4449873-2F46-5528-A662-79E58649B3DB}"/>
+              </a:ext>
+            </a:extLst>
+          </p:cNvPr>
+          <p:cNvSpPr>
+            <a:spLocks noGrp="1"/>
+          </p:cNvSpPr>
+          <p:nvPr>
+            <p:ph type="sldNum" sz="quarter" idx="5"/>
+          </p:nvPr>
+        </p:nvSpPr>
+        <p:spPr/>
+        <p:txBody>
+          <a:bodyPr/>
+          <a:lstStyle/>
+          <a:p>
+            <a:fld id="{45585562-E4A3-4817-8CCA-C95F0C79664B}" type="slidenum">
+              <a:rPr lang="en-US" smtClean="0"/>
+              <a:t>31</a:t>
+            </a:fld>
+            <a:endParaRPr lang="en-US"/>
+          </a:p>
+        </p:txBody>
+      </p:sp>
+    </p:spTree>
+    <p:extLst>
+      <p:ext uri="{BB962C8B-B14F-4D97-AF65-F5344CB8AC3E}">
+        <p14:creationId xmlns:p14="http://schemas.microsoft.com/office/powerpoint/2010/main" val="415841522"/>
+      </p:ext>
+    </p:extLst>
+  </p:cSld>
+  <p:clrMapOvr>
+    <a:masterClrMapping/>
+  </p:clrMapOvr>
+</p:notes>
+</file>
+
 <file path=ppt/slideLayouts/slideLayout1.xml><?xml version="1.0" encoding="utf-8"?>
 <p:sldLayout xmlns:a="http://schemas.openxmlformats.org/drawingml/2006/main" xmlns:r="http://schemas.openxmlformats.org/officeDocument/2006/relationships" xmlns:p="http://schemas.openxmlformats.org/presentationml/2006/main" type="title" preserve="1">
   <p:cSld name="Title Slide">
@@ -1758,7 +1758,7 @@
           <a:p>
             <a:fld id="{B616CDE8-C118-489E-BA54-73CDE3A64F8D}" type="datetimeFigureOut">
               <a:rPr lang="en-US" smtClean="0"/>
-              <a:t>2/1/2026</a:t>
+              <a:t>2/3/2026</a:t>
             </a:fld>
             <a:endParaRPr lang="en-US"/>
           </a:p>
@@ -1956,7 +1956,7 @@
           <a:p>
             <a:fld id="{B616CDE8-C118-489E-BA54-73CDE3A64F8D}" type="datetimeFigureOut">
               <a:rPr lang="en-US" smtClean="0"/>
-              <a:t>2/1/2026</a:t>
+              <a:t>2/3/2026</a:t>
             </a:fld>
             <a:endParaRPr lang="en-US"/>
           </a:p>
@@ -2164,7 +2164,7 @@
           <a:p>
             <a:fld id="{B616CDE8-C118-489E-BA54-73CDE3A64F8D}" type="datetimeFigureOut">
               <a:rPr lang="en-US" smtClean="0"/>
-              <a:t>2/1/2026</a:t>
+              <a:t>2/3/2026</a:t>
             </a:fld>
             <a:endParaRPr lang="en-US"/>
           </a:p>
@@ -2384,7 +2384,7 @@
           <a:p>
             <a:fld id="{B9268321-C9E7-441E-8ECB-F5B48CA38B30}" type="datetimeFigureOut">
               <a:rPr lang="en-US" smtClean="0"/>
-              <a:t>2/1/2026</a:t>
+              <a:t>2/3/2026</a:t>
             </a:fld>
             <a:endParaRPr lang="en-US"/>
           </a:p>
@@ -2582,7 +2582,7 @@
           <a:p>
             <a:fld id="{B9268321-C9E7-441E-8ECB-F5B48CA38B30}" type="datetimeFigureOut">
               <a:rPr lang="en-US" smtClean="0"/>
-              <a:t>2/1/2026</a:t>
+              <a:t>2/3/2026</a:t>
             </a:fld>
             <a:endParaRPr lang="en-US"/>
           </a:p>
@@ -2857,7 +2857,7 @@
           <a:p>
             <a:fld id="{B9268321-C9E7-441E-8ECB-F5B48CA38B30}" type="datetimeFigureOut">
               <a:rPr lang="en-US" smtClean="0"/>
-              <a:t>2/1/2026</a:t>
+              <a:t>2/3/2026</a:t>
             </a:fld>
             <a:endParaRPr lang="en-US"/>
           </a:p>
@@ -3122,7 +3122,7 @@
           <a:p>
             <a:fld id="{B9268321-C9E7-441E-8ECB-F5B48CA38B30}" type="datetimeFigureOut">
               <a:rPr lang="en-US" smtClean="0"/>
-              <a:t>2/1/2026</a:t>
+              <a:t>2/3/2026</a:t>
             </a:fld>
             <a:endParaRPr lang="en-US"/>
           </a:p>
@@ -3534,7 +3534,7 @@
           <a:p>
             <a:fld id="{B9268321-C9E7-441E-8ECB-F5B48CA38B30}" type="datetimeFigureOut">
               <a:rPr lang="en-US" smtClean="0"/>
-              <a:t>2/1/2026</a:t>
+              <a:t>2/3/2026</a:t>
             </a:fld>
             <a:endParaRPr lang="en-US"/>
           </a:p>
@@ -3675,7 +3675,7 @@
           <a:p>
             <a:fld id="{B9268321-C9E7-441E-8ECB-F5B48CA38B30}" type="datetimeFigureOut">
               <a:rPr lang="en-US" smtClean="0"/>
-              <a:t>2/1/2026</a:t>
+              <a:t>2/3/2026</a:t>
             </a:fld>
             <a:endParaRPr lang="en-US"/>
           </a:p>
@@ -3788,7 +3788,7 @@
           <a:p>
             <a:fld id="{B9268321-C9E7-441E-8ECB-F5B48CA38B30}" type="datetimeFigureOut">
               <a:rPr lang="en-US" smtClean="0"/>
-              <a:t>2/1/2026</a:t>
+              <a:t>2/3/2026</a:t>
             </a:fld>
             <a:endParaRPr lang="en-US"/>
           </a:p>
@@ -4099,7 +4099,7 @@
           <a:p>
             <a:fld id="{B9268321-C9E7-441E-8ECB-F5B48CA38B30}" type="datetimeFigureOut">
               <a:rPr lang="en-US" smtClean="0"/>
-              <a:t>2/1/2026</a:t>
+              <a:t>2/3/2026</a:t>
             </a:fld>
             <a:endParaRPr lang="en-US"/>
           </a:p>
@@ -4297,7 +4297,7 @@
           <a:p>
             <a:fld id="{B616CDE8-C118-489E-BA54-73CDE3A64F8D}" type="datetimeFigureOut">
               <a:rPr lang="en-US" smtClean="0"/>
-              <a:t>2/1/2026</a:t>
+              <a:t>2/3/2026</a:t>
             </a:fld>
             <a:endParaRPr lang="en-US"/>
           </a:p>
@@ -4585,7 +4585,7 @@
           <a:p>
             <a:fld id="{B9268321-C9E7-441E-8ECB-F5B48CA38B30}" type="datetimeFigureOut">
               <a:rPr lang="en-US" smtClean="0"/>
-              <a:t>2/1/2026</a:t>
+              <a:t>2/3/2026</a:t>
             </a:fld>
             <a:endParaRPr lang="en-US"/>
           </a:p>
@@ -4783,7 +4783,7 @@
           <a:p>
             <a:fld id="{B9268321-C9E7-441E-8ECB-F5B48CA38B30}" type="datetimeFigureOut">
               <a:rPr lang="en-US" smtClean="0"/>
-              <a:t>2/1/2026</a:t>
+              <a:t>2/3/2026</a:t>
             </a:fld>
             <a:endParaRPr lang="en-US"/>
           </a:p>
@@ -4991,7 +4991,7 @@
           <a:p>
             <a:fld id="{B9268321-C9E7-441E-8ECB-F5B48CA38B30}" type="datetimeFigureOut">
               <a:rPr lang="en-US" smtClean="0"/>
-              <a:t>2/1/2026</a:t>
+              <a:t>2/3/2026</a:t>
             </a:fld>
             <a:endParaRPr lang="en-US"/>
           </a:p>
@@ -5266,7 +5266,7 @@
           <a:p>
             <a:fld id="{B616CDE8-C118-489E-BA54-73CDE3A64F8D}" type="datetimeFigureOut">
               <a:rPr lang="en-US" smtClean="0"/>
-              <a:t>2/1/2026</a:t>
+              <a:t>2/3/2026</a:t>
             </a:fld>
             <a:endParaRPr lang="en-US"/>
           </a:p>
@@ -5531,7 +5531,7 @@
           <a:p>
             <a:fld id="{B616CDE8-C118-489E-BA54-73CDE3A64F8D}" type="datetimeFigureOut">
               <a:rPr lang="en-US" smtClean="0"/>
-              <a:t>2/1/2026</a:t>
+              <a:t>2/3/2026</a:t>
             </a:fld>
             <a:endParaRPr lang="en-US"/>
           </a:p>
@@ -5943,7 +5943,7 @@
           <a:p>
             <a:fld id="{B616CDE8-C118-489E-BA54-73CDE3A64F8D}" type="datetimeFigureOut">
               <a:rPr lang="en-US" smtClean="0"/>
-              <a:t>2/1/2026</a:t>
+              <a:t>2/3/2026</a:t>
             </a:fld>
             <a:endParaRPr lang="en-US"/>
           </a:p>
@@ -6084,7 +6084,7 @@
           <a:p>
             <a:fld id="{B616CDE8-C118-489E-BA54-73CDE3A64F8D}" type="datetimeFigureOut">
               <a:rPr lang="en-US" smtClean="0"/>
-              <a:t>2/1/2026</a:t>
+              <a:t>2/3/2026</a:t>
             </a:fld>
             <a:endParaRPr lang="en-US"/>
           </a:p>
@@ -6197,7 +6197,7 @@
           <a:p>
             <a:fld id="{B616CDE8-C118-489E-BA54-73CDE3A64F8D}" type="datetimeFigureOut">
               <a:rPr lang="en-US" smtClean="0"/>
-              <a:t>2/1/2026</a:t>
+              <a:t>2/3/2026</a:t>
             </a:fld>
             <a:endParaRPr lang="en-US"/>
           </a:p>
@@ -6508,7 +6508,7 @@
           <a:p>
             <a:fld id="{B616CDE8-C118-489E-BA54-73CDE3A64F8D}" type="datetimeFigureOut">
               <a:rPr lang="en-US" smtClean="0"/>
-              <a:t>2/1/2026</a:t>
+              <a:t>2/3/2026</a:t>
             </a:fld>
             <a:endParaRPr lang="en-US"/>
           </a:p>
@@ -6796,7 +6796,7 @@
           <a:p>
             <a:fld id="{B616CDE8-C118-489E-BA54-73CDE3A64F8D}" type="datetimeFigureOut">
               <a:rPr lang="en-US" smtClean="0"/>
-              <a:t>2/1/2026</a:t>
+              <a:t>2/3/2026</a:t>
             </a:fld>
             <a:endParaRPr lang="en-US"/>
           </a:p>
@@ -7037,7 +7037,7 @@
           <a:p>
             <a:fld id="{B616CDE8-C118-489E-BA54-73CDE3A64F8D}" type="datetimeFigureOut">
               <a:rPr lang="en-US" smtClean="0"/>
-              <a:t>2/1/2026</a:t>
+              <a:t>2/3/2026</a:t>
             </a:fld>
             <a:endParaRPr lang="en-US"/>
           </a:p>
@@ -7605,7 +7605,7 @@
           <a:p>
             <a:fld id="{B9268321-C9E7-441E-8ECB-F5B48CA38B30}" type="datetimeFigureOut">
               <a:rPr lang="en-US" smtClean="0"/>
-              <a:t>2/1/2026</a:t>
+              <a:t>2/3/2026</a:t>
             </a:fld>
             <a:endParaRPr lang="en-US"/>
           </a:p>
@@ -24780,6 +24780,313 @@
 <file path=ppt/slides/slide31.xml><?xml version="1.0" encoding="utf-8"?>
 <p:sld xmlns:a="http://schemas.openxmlformats.org/drawingml/2006/main" xmlns:r="http://schemas.openxmlformats.org/officeDocument/2006/relationships" xmlns:p="http://schemas.openxmlformats.org/presentationml/2006/main">
   <p:cSld>
+    <p:spTree>
+      <p:nvGrpSpPr>
+        <p:cNvPr id="1" name="">
+          <a:extLst>
+            <a:ext uri="{FF2B5EF4-FFF2-40B4-BE49-F238E27FC236}">
+              <a16:creationId xmlns:a16="http://schemas.microsoft.com/office/drawing/2014/main" id="{AD345C1D-13C5-F44F-78B8-0B2491BA4043}"/>
+            </a:ext>
+          </a:extLst>
+        </p:cNvPr>
+        <p:cNvGrpSpPr/>
+        <p:nvPr/>
+      </p:nvGrpSpPr>
+      <p:grpSpPr>
+        <a:xfrm>
+          <a:off x="0" y="0"/>
+          <a:ext cx="0" cy="0"/>
+          <a:chOff x="0" y="0"/>
+          <a:chExt cx="0" cy="0"/>
+        </a:xfrm>
+      </p:grpSpPr>
+      <p:sp>
+        <p:nvSpPr>
+          <p:cNvPr id="2" name="Title 1">
+            <a:extLst>
+              <a:ext uri="{FF2B5EF4-FFF2-40B4-BE49-F238E27FC236}">
+                <a16:creationId xmlns:a16="http://schemas.microsoft.com/office/drawing/2014/main" id="{FAC91324-AFAE-4F2B-8AD0-2BA7D70D0C33}"/>
+              </a:ext>
+            </a:extLst>
+          </p:cNvPr>
+          <p:cNvSpPr>
+            <a:spLocks noGrp="1"/>
+          </p:cNvSpPr>
+          <p:nvPr>
+            <p:ph type="title"/>
+          </p:nvPr>
+        </p:nvSpPr>
+        <p:spPr/>
+        <p:txBody>
+          <a:bodyPr/>
+          <a:lstStyle/>
+          <a:p>
+            <a:pPr algn="ctr"/>
+            <a:r>
+              <a:rPr lang="en-US" dirty="0"/>
+              <a:t>Private AKS Cluster</a:t>
+            </a:r>
+          </a:p>
+        </p:txBody>
+      </p:sp>
+      <p:sp>
+        <p:nvSpPr>
+          <p:cNvPr id="6" name="TextBox 5">
+            <a:extLst>
+              <a:ext uri="{FF2B5EF4-FFF2-40B4-BE49-F238E27FC236}">
+                <a16:creationId xmlns:a16="http://schemas.microsoft.com/office/drawing/2014/main" id="{53384BD0-8B32-8F24-788C-4FAAF69842B1}"/>
+              </a:ext>
+            </a:extLst>
+          </p:cNvPr>
+          <p:cNvSpPr txBox="1"/>
+          <p:nvPr/>
+        </p:nvSpPr>
+        <p:spPr>
+          <a:xfrm>
+            <a:off x="354664" y="1869819"/>
+            <a:ext cx="1670842" cy="369332"/>
+          </a:xfrm>
+          <a:prstGeom prst="rect">
+            <a:avLst/>
+          </a:prstGeom>
+          <a:noFill/>
+        </p:spPr>
+        <p:txBody>
+          <a:bodyPr wrap="none" rtlCol="0">
+            <a:spAutoFit/>
+          </a:bodyPr>
+          <a:lstStyle/>
+          <a:p>
+            <a:r>
+              <a:rPr lang="en-US" b="1" dirty="0">
+                <a:solidFill>
+                  <a:srgbClr val="0070C0"/>
+                </a:solidFill>
+              </a:rPr>
+              <a:t>Public Cluster</a:t>
+            </a:r>
+          </a:p>
+        </p:txBody>
+      </p:sp>
+      <p:sp>
+        <p:nvSpPr>
+          <p:cNvPr id="7" name="TextBox 6">
+            <a:extLst>
+              <a:ext uri="{FF2B5EF4-FFF2-40B4-BE49-F238E27FC236}">
+                <a16:creationId xmlns:a16="http://schemas.microsoft.com/office/drawing/2014/main" id="{E8B523D8-F0D3-1AEC-41B2-424A4FCCB8FB}"/>
+              </a:ext>
+            </a:extLst>
+          </p:cNvPr>
+          <p:cNvSpPr txBox="1"/>
+          <p:nvPr/>
+        </p:nvSpPr>
+        <p:spPr>
+          <a:xfrm>
+            <a:off x="6324099" y="1869819"/>
+            <a:ext cx="1738746" cy="369332"/>
+          </a:xfrm>
+          <a:prstGeom prst="rect">
+            <a:avLst/>
+          </a:prstGeom>
+          <a:noFill/>
+        </p:spPr>
+        <p:txBody>
+          <a:bodyPr wrap="none" rtlCol="0">
+            <a:spAutoFit/>
+          </a:bodyPr>
+          <a:lstStyle/>
+          <a:p>
+            <a:r>
+              <a:rPr lang="en-US" b="1" dirty="0">
+                <a:solidFill>
+                  <a:srgbClr val="EE0000"/>
+                </a:solidFill>
+              </a:rPr>
+              <a:t>Private Cluster</a:t>
+            </a:r>
+          </a:p>
+        </p:txBody>
+      </p:sp>
+      <p:pic>
+        <p:nvPicPr>
+          <p:cNvPr id="4" name="Picture 3">
+            <a:extLst>
+              <a:ext uri="{FF2B5EF4-FFF2-40B4-BE49-F238E27FC236}">
+                <a16:creationId xmlns:a16="http://schemas.microsoft.com/office/drawing/2014/main" id="{255FF1FD-7E43-9ABF-8AED-2BFCB1B32DAA}"/>
+              </a:ext>
+            </a:extLst>
+          </p:cNvPr>
+          <p:cNvPicPr>
+            <a:picLocks noChangeAspect="1"/>
+          </p:cNvPicPr>
+          <p:nvPr/>
+        </p:nvPicPr>
+        <p:blipFill>
+          <a:blip r:embed="rId3"/>
+          <a:stretch>
+            <a:fillRect/>
+          </a:stretch>
+        </p:blipFill>
+        <p:spPr>
+          <a:xfrm>
+            <a:off x="426809" y="2490536"/>
+            <a:ext cx="4939517" cy="3828126"/>
+          </a:xfrm>
+          <a:prstGeom prst="rect">
+            <a:avLst/>
+          </a:prstGeom>
+        </p:spPr>
+      </p:pic>
+      <p:sp>
+        <p:nvSpPr>
+          <p:cNvPr id="5" name="Rectangle 4">
+            <a:extLst>
+              <a:ext uri="{FF2B5EF4-FFF2-40B4-BE49-F238E27FC236}">
+                <a16:creationId xmlns:a16="http://schemas.microsoft.com/office/drawing/2014/main" id="{34CEEA30-4F30-3A6E-8EBE-6FA7DE09DE62}"/>
+              </a:ext>
+            </a:extLst>
+          </p:cNvPr>
+          <p:cNvSpPr/>
+          <p:nvPr/>
+        </p:nvSpPr>
+        <p:spPr>
+          <a:xfrm>
+            <a:off x="2817091" y="4230255"/>
+            <a:ext cx="1219200" cy="563418"/>
+          </a:xfrm>
+          <a:prstGeom prst="rect">
+            <a:avLst/>
+          </a:prstGeom>
+          <a:noFill/>
+          <a:ln w="57150">
+            <a:solidFill>
+              <a:srgbClr val="0070C0"/>
+            </a:solidFill>
+          </a:ln>
+        </p:spPr>
+        <p:style>
+          <a:lnRef idx="2">
+            <a:schemeClr val="accent1">
+              <a:shade val="15000"/>
+            </a:schemeClr>
+          </a:lnRef>
+          <a:fillRef idx="1">
+            <a:schemeClr val="accent1"/>
+          </a:fillRef>
+          <a:effectRef idx="0">
+            <a:schemeClr val="accent1"/>
+          </a:effectRef>
+          <a:fontRef idx="minor">
+            <a:schemeClr val="lt1"/>
+          </a:fontRef>
+        </p:style>
+        <p:txBody>
+          <a:bodyPr rtlCol="0" anchor="ctr"/>
+          <a:lstStyle/>
+          <a:p>
+            <a:pPr algn="ctr"/>
+            <a:endParaRPr lang="en-US"/>
+          </a:p>
+        </p:txBody>
+      </p:sp>
+      <p:pic>
+        <p:nvPicPr>
+          <p:cNvPr id="8" name="Picture 7">
+            <a:extLst>
+              <a:ext uri="{FF2B5EF4-FFF2-40B4-BE49-F238E27FC236}">
+                <a16:creationId xmlns:a16="http://schemas.microsoft.com/office/drawing/2014/main" id="{6513F218-2616-A8EB-2841-5820810BA314}"/>
+              </a:ext>
+            </a:extLst>
+          </p:cNvPr>
+          <p:cNvPicPr>
+            <a:picLocks noChangeAspect="1"/>
+          </p:cNvPicPr>
+          <p:nvPr/>
+        </p:nvPicPr>
+        <p:blipFill>
+          <a:blip r:embed="rId4"/>
+          <a:stretch>
+            <a:fillRect/>
+          </a:stretch>
+        </p:blipFill>
+        <p:spPr>
+          <a:xfrm>
+            <a:off x="6169891" y="3044377"/>
+            <a:ext cx="5443598" cy="3313864"/>
+          </a:xfrm>
+          <a:prstGeom prst="rect">
+            <a:avLst/>
+          </a:prstGeom>
+        </p:spPr>
+      </p:pic>
+      <p:sp>
+        <p:nvSpPr>
+          <p:cNvPr id="9" name="Rectangle 8">
+            <a:extLst>
+              <a:ext uri="{FF2B5EF4-FFF2-40B4-BE49-F238E27FC236}">
+                <a16:creationId xmlns:a16="http://schemas.microsoft.com/office/drawing/2014/main" id="{112AF880-7FB9-8835-23A6-A9B3D1FC6A3A}"/>
+              </a:ext>
+            </a:extLst>
+          </p:cNvPr>
+          <p:cNvSpPr/>
+          <p:nvPr/>
+        </p:nvSpPr>
+        <p:spPr>
+          <a:xfrm>
+            <a:off x="8358909" y="4165600"/>
+            <a:ext cx="1246909" cy="535709"/>
+          </a:xfrm>
+          <a:prstGeom prst="rect">
+            <a:avLst/>
+          </a:prstGeom>
+          <a:noFill/>
+          <a:ln w="57150">
+            <a:solidFill>
+              <a:srgbClr val="EE0000"/>
+            </a:solidFill>
+          </a:ln>
+        </p:spPr>
+        <p:style>
+          <a:lnRef idx="2">
+            <a:schemeClr val="accent1">
+              <a:shade val="15000"/>
+            </a:schemeClr>
+          </a:lnRef>
+          <a:fillRef idx="1">
+            <a:schemeClr val="accent1"/>
+          </a:fillRef>
+          <a:effectRef idx="0">
+            <a:schemeClr val="accent1"/>
+          </a:effectRef>
+          <a:fontRef idx="minor">
+            <a:schemeClr val="lt1"/>
+          </a:fontRef>
+        </p:style>
+        <p:txBody>
+          <a:bodyPr rtlCol="0" anchor="ctr"/>
+          <a:lstStyle/>
+          <a:p>
+            <a:pPr algn="ctr"/>
+            <a:endParaRPr lang="en-US"/>
+          </a:p>
+        </p:txBody>
+      </p:sp>
+    </p:spTree>
+    <p:extLst>
+      <p:ext uri="{BB962C8B-B14F-4D97-AF65-F5344CB8AC3E}">
+        <p14:creationId xmlns:p14="http://schemas.microsoft.com/office/powerpoint/2010/main" val="598411799"/>
+      </p:ext>
+    </p:extLst>
+  </p:cSld>
+  <p:clrMapOvr>
+    <a:masterClrMapping/>
+  </p:clrMapOvr>
+</p:sld>
+</file>
+
+<file path=ppt/slides/slide32.xml><?xml version="1.0" encoding="utf-8"?>
+<p:sld xmlns:a="http://schemas.openxmlformats.org/drawingml/2006/main" xmlns:r="http://schemas.openxmlformats.org/officeDocument/2006/relationships" xmlns:p="http://schemas.openxmlformats.org/presentationml/2006/main">
+  <p:cSld>
     <p:bg>
       <p:bgPr>
         <a:solidFill>
@@ -25392,7 +25699,7 @@
 </p:sld>
 </file>
 
-<file path=ppt/slides/slide32.xml><?xml version="1.0" encoding="utf-8"?>
+<file path=ppt/slides/slide33.xml><?xml version="1.0" encoding="utf-8"?>
 <p:sld xmlns:a="http://schemas.openxmlformats.org/drawingml/2006/main" xmlns:r="http://schemas.openxmlformats.org/officeDocument/2006/relationships" xmlns:p="http://schemas.openxmlformats.org/presentationml/2006/main">
   <p:cSld>
     <p:bg>
@@ -26007,7 +26314,7 @@
 </p:sld>
 </file>
 
-<file path=ppt/slides/slide33.xml><?xml version="1.0" encoding="utf-8"?>
+<file path=ppt/slides/slide34.xml><?xml version="1.0" encoding="utf-8"?>
 <p:sld xmlns:a="http://schemas.openxmlformats.org/drawingml/2006/main" xmlns:r="http://schemas.openxmlformats.org/officeDocument/2006/relationships" xmlns:p="http://schemas.openxmlformats.org/presentationml/2006/main">
   <p:cSld>
     <p:bg>
@@ -26354,7 +26661,7 @@
 </p:sld>
 </file>
 
-<file path=ppt/slides/slide34.xml><?xml version="1.0" encoding="utf-8"?>
+<file path=ppt/slides/slide35.xml><?xml version="1.0" encoding="utf-8"?>
 <p:sld xmlns:a="http://schemas.openxmlformats.org/drawingml/2006/main" xmlns:r="http://schemas.openxmlformats.org/officeDocument/2006/relationships" xmlns:p="http://schemas.openxmlformats.org/presentationml/2006/main">
   <p:cSld>
     <p:bg>

</xml_diff>

<commit_message>
added various futures and fixed typos
</commit_message>
<xml_diff>
--- a/AKS_01_Core_and_Setup.pptx
+++ b/AKS_01_Core_and_Setup.pptx
@@ -163,10 +163,71 @@
   <pc:docChgLst>
     <pc:chgData name="faik bilgen" userId="9fcb1696e65a161f" providerId="LiveId" clId="{0C3A4C9E-717D-4ADE-97E0-B0AD580B3355}"/>
     <pc:docChg chg="undo custSel addSld delSld modSld sldOrd">
-      <pc:chgData name="faik bilgen" userId="9fcb1696e65a161f" providerId="LiveId" clId="{0C3A4C9E-717D-4ADE-97E0-B0AD580B3355}" dt="2026-02-03T05:55:33.579" v="739" actId="1076"/>
+      <pc:chgData name="faik bilgen" userId="9fcb1696e65a161f" providerId="LiveId" clId="{0C3A4C9E-717D-4ADE-97E0-B0AD580B3355}" dt="2026-02-04T05:29:42.658" v="746" actId="1076"/>
       <pc:docMkLst>
         <pc:docMk/>
       </pc:docMkLst>
+      <pc:sldChg chg="modSp mod">
+        <pc:chgData name="faik bilgen" userId="9fcb1696e65a161f" providerId="LiveId" clId="{0C3A4C9E-717D-4ADE-97E0-B0AD580B3355}" dt="2026-02-04T05:29:06.482" v="742" actId="14100"/>
+        <pc:sldMkLst>
+          <pc:docMk/>
+          <pc:sldMk cId="3180168693" sldId="257"/>
+        </pc:sldMkLst>
+        <pc:graphicFrameChg chg="mod">
+          <ac:chgData name="faik bilgen" userId="9fcb1696e65a161f" providerId="LiveId" clId="{0C3A4C9E-717D-4ADE-97E0-B0AD580B3355}" dt="2026-02-04T05:28:58.921" v="740" actId="1076"/>
+          <ac:graphicFrameMkLst>
+            <pc:docMk/>
+            <pc:sldMk cId="3180168693" sldId="257"/>
+            <ac:graphicFrameMk id="5" creationId="{FDB5596D-B5EB-4F51-B104-1E68501723E6}"/>
+          </ac:graphicFrameMkLst>
+        </pc:graphicFrameChg>
+        <pc:picChg chg="mod">
+          <ac:chgData name="faik bilgen" userId="9fcb1696e65a161f" providerId="LiveId" clId="{0C3A4C9E-717D-4ADE-97E0-B0AD580B3355}" dt="2026-02-04T05:29:06.482" v="742" actId="14100"/>
+          <ac:picMkLst>
+            <pc:docMk/>
+            <pc:sldMk cId="3180168693" sldId="257"/>
+            <ac:picMk id="3" creationId="{20A97B22-892C-F67C-F7CA-236A3374C462}"/>
+          </ac:picMkLst>
+        </pc:picChg>
+      </pc:sldChg>
+      <pc:sldChg chg="modSp mod">
+        <pc:chgData name="faik bilgen" userId="9fcb1696e65a161f" providerId="LiveId" clId="{0C3A4C9E-717D-4ADE-97E0-B0AD580B3355}" dt="2026-02-04T05:29:21.269" v="744" actId="1076"/>
+        <pc:sldMkLst>
+          <pc:docMk/>
+          <pc:sldMk cId="1715846408" sldId="258"/>
+        </pc:sldMkLst>
+        <pc:picChg chg="mod">
+          <ac:chgData name="faik bilgen" userId="9fcb1696e65a161f" providerId="LiveId" clId="{0C3A4C9E-717D-4ADE-97E0-B0AD580B3355}" dt="2026-02-04T05:29:21.269" v="744" actId="1076"/>
+          <ac:picMkLst>
+            <pc:docMk/>
+            <pc:sldMk cId="1715846408" sldId="258"/>
+            <ac:picMk id="6" creationId="{E98C48E4-C6B7-5FFE-60AF-6BF91DD0DD23}"/>
+          </ac:picMkLst>
+        </pc:picChg>
+      </pc:sldChg>
+      <pc:sldChg chg="modSp mod">
+        <pc:chgData name="faik bilgen" userId="9fcb1696e65a161f" providerId="LiveId" clId="{0C3A4C9E-717D-4ADE-97E0-B0AD580B3355}" dt="2026-02-04T05:29:42.658" v="746" actId="1076"/>
+        <pc:sldMkLst>
+          <pc:docMk/>
+          <pc:sldMk cId="2857814632" sldId="259"/>
+        </pc:sldMkLst>
+        <pc:graphicFrameChg chg="mod">
+          <ac:chgData name="faik bilgen" userId="9fcb1696e65a161f" providerId="LiveId" clId="{0C3A4C9E-717D-4ADE-97E0-B0AD580B3355}" dt="2026-02-04T05:29:42.658" v="746" actId="1076"/>
+          <ac:graphicFrameMkLst>
+            <pc:docMk/>
+            <pc:sldMk cId="2857814632" sldId="259"/>
+            <ac:graphicFrameMk id="3" creationId="{822E0BD8-4377-0EA0-B4F5-C4AAA074CAE4}"/>
+          </ac:graphicFrameMkLst>
+        </pc:graphicFrameChg>
+        <pc:picChg chg="mod">
+          <ac:chgData name="faik bilgen" userId="9fcb1696e65a161f" providerId="LiveId" clId="{0C3A4C9E-717D-4ADE-97E0-B0AD580B3355}" dt="2026-02-04T05:29:35.546" v="745" actId="14100"/>
+          <ac:picMkLst>
+            <pc:docMk/>
+            <pc:sldMk cId="2857814632" sldId="259"/>
+            <ac:picMk id="4" creationId="{0DA98881-624A-66E5-F61B-9DADC7570D1F}"/>
+          </ac:picMkLst>
+        </pc:picChg>
+      </pc:sldChg>
       <pc:sldChg chg="modSp add mod">
         <pc:chgData name="faik bilgen" userId="9fcb1696e65a161f" providerId="LiveId" clId="{0C3A4C9E-717D-4ADE-97E0-B0AD580B3355}" dt="2026-01-16T08:40:18.944" v="26" actId="20577"/>
         <pc:sldMkLst>
@@ -773,7 +834,7 @@
           <a:p>
             <a:fld id="{BB3ADA56-F335-42A3-B626-59F513015A5C}" type="datetimeFigureOut">
               <a:rPr lang="en-US" smtClean="0"/>
-              <a:t>2/3/2026</a:t>
+              <a:t>2/4/2026</a:t>
             </a:fld>
             <a:endParaRPr lang="en-US"/>
           </a:p>
@@ -1758,7 +1819,7 @@
           <a:p>
             <a:fld id="{B616CDE8-C118-489E-BA54-73CDE3A64F8D}" type="datetimeFigureOut">
               <a:rPr lang="en-US" smtClean="0"/>
-              <a:t>2/3/2026</a:t>
+              <a:t>2/4/2026</a:t>
             </a:fld>
             <a:endParaRPr lang="en-US"/>
           </a:p>
@@ -1956,7 +2017,7 @@
           <a:p>
             <a:fld id="{B616CDE8-C118-489E-BA54-73CDE3A64F8D}" type="datetimeFigureOut">
               <a:rPr lang="en-US" smtClean="0"/>
-              <a:t>2/3/2026</a:t>
+              <a:t>2/4/2026</a:t>
             </a:fld>
             <a:endParaRPr lang="en-US"/>
           </a:p>
@@ -2164,7 +2225,7 @@
           <a:p>
             <a:fld id="{B616CDE8-C118-489E-BA54-73CDE3A64F8D}" type="datetimeFigureOut">
               <a:rPr lang="en-US" smtClean="0"/>
-              <a:t>2/3/2026</a:t>
+              <a:t>2/4/2026</a:t>
             </a:fld>
             <a:endParaRPr lang="en-US"/>
           </a:p>
@@ -2384,7 +2445,7 @@
           <a:p>
             <a:fld id="{B9268321-C9E7-441E-8ECB-F5B48CA38B30}" type="datetimeFigureOut">
               <a:rPr lang="en-US" smtClean="0"/>
-              <a:t>2/3/2026</a:t>
+              <a:t>2/4/2026</a:t>
             </a:fld>
             <a:endParaRPr lang="en-US"/>
           </a:p>
@@ -2582,7 +2643,7 @@
           <a:p>
             <a:fld id="{B9268321-C9E7-441E-8ECB-F5B48CA38B30}" type="datetimeFigureOut">
               <a:rPr lang="en-US" smtClean="0"/>
-              <a:t>2/3/2026</a:t>
+              <a:t>2/4/2026</a:t>
             </a:fld>
             <a:endParaRPr lang="en-US"/>
           </a:p>
@@ -2857,7 +2918,7 @@
           <a:p>
             <a:fld id="{B9268321-C9E7-441E-8ECB-F5B48CA38B30}" type="datetimeFigureOut">
               <a:rPr lang="en-US" smtClean="0"/>
-              <a:t>2/3/2026</a:t>
+              <a:t>2/4/2026</a:t>
             </a:fld>
             <a:endParaRPr lang="en-US"/>
           </a:p>
@@ -3122,7 +3183,7 @@
           <a:p>
             <a:fld id="{B9268321-C9E7-441E-8ECB-F5B48CA38B30}" type="datetimeFigureOut">
               <a:rPr lang="en-US" smtClean="0"/>
-              <a:t>2/3/2026</a:t>
+              <a:t>2/4/2026</a:t>
             </a:fld>
             <a:endParaRPr lang="en-US"/>
           </a:p>
@@ -3534,7 +3595,7 @@
           <a:p>
             <a:fld id="{B9268321-C9E7-441E-8ECB-F5B48CA38B30}" type="datetimeFigureOut">
               <a:rPr lang="en-US" smtClean="0"/>
-              <a:t>2/3/2026</a:t>
+              <a:t>2/4/2026</a:t>
             </a:fld>
             <a:endParaRPr lang="en-US"/>
           </a:p>
@@ -3675,7 +3736,7 @@
           <a:p>
             <a:fld id="{B9268321-C9E7-441E-8ECB-F5B48CA38B30}" type="datetimeFigureOut">
               <a:rPr lang="en-US" smtClean="0"/>
-              <a:t>2/3/2026</a:t>
+              <a:t>2/4/2026</a:t>
             </a:fld>
             <a:endParaRPr lang="en-US"/>
           </a:p>
@@ -3788,7 +3849,7 @@
           <a:p>
             <a:fld id="{B9268321-C9E7-441E-8ECB-F5B48CA38B30}" type="datetimeFigureOut">
               <a:rPr lang="en-US" smtClean="0"/>
-              <a:t>2/3/2026</a:t>
+              <a:t>2/4/2026</a:t>
             </a:fld>
             <a:endParaRPr lang="en-US"/>
           </a:p>
@@ -4099,7 +4160,7 @@
           <a:p>
             <a:fld id="{B9268321-C9E7-441E-8ECB-F5B48CA38B30}" type="datetimeFigureOut">
               <a:rPr lang="en-US" smtClean="0"/>
-              <a:t>2/3/2026</a:t>
+              <a:t>2/4/2026</a:t>
             </a:fld>
             <a:endParaRPr lang="en-US"/>
           </a:p>
@@ -4297,7 +4358,7 @@
           <a:p>
             <a:fld id="{B616CDE8-C118-489E-BA54-73CDE3A64F8D}" type="datetimeFigureOut">
               <a:rPr lang="en-US" smtClean="0"/>
-              <a:t>2/3/2026</a:t>
+              <a:t>2/4/2026</a:t>
             </a:fld>
             <a:endParaRPr lang="en-US"/>
           </a:p>
@@ -4585,7 +4646,7 @@
           <a:p>
             <a:fld id="{B9268321-C9E7-441E-8ECB-F5B48CA38B30}" type="datetimeFigureOut">
               <a:rPr lang="en-US" smtClean="0"/>
-              <a:t>2/3/2026</a:t>
+              <a:t>2/4/2026</a:t>
             </a:fld>
             <a:endParaRPr lang="en-US"/>
           </a:p>
@@ -4783,7 +4844,7 @@
           <a:p>
             <a:fld id="{B9268321-C9E7-441E-8ECB-F5B48CA38B30}" type="datetimeFigureOut">
               <a:rPr lang="en-US" smtClean="0"/>
-              <a:t>2/3/2026</a:t>
+              <a:t>2/4/2026</a:t>
             </a:fld>
             <a:endParaRPr lang="en-US"/>
           </a:p>
@@ -4991,7 +5052,7 @@
           <a:p>
             <a:fld id="{B9268321-C9E7-441E-8ECB-F5B48CA38B30}" type="datetimeFigureOut">
               <a:rPr lang="en-US" smtClean="0"/>
-              <a:t>2/3/2026</a:t>
+              <a:t>2/4/2026</a:t>
             </a:fld>
             <a:endParaRPr lang="en-US"/>
           </a:p>
@@ -5266,7 +5327,7 @@
           <a:p>
             <a:fld id="{B616CDE8-C118-489E-BA54-73CDE3A64F8D}" type="datetimeFigureOut">
               <a:rPr lang="en-US" smtClean="0"/>
-              <a:t>2/3/2026</a:t>
+              <a:t>2/4/2026</a:t>
             </a:fld>
             <a:endParaRPr lang="en-US"/>
           </a:p>
@@ -5531,7 +5592,7 @@
           <a:p>
             <a:fld id="{B616CDE8-C118-489E-BA54-73CDE3A64F8D}" type="datetimeFigureOut">
               <a:rPr lang="en-US" smtClean="0"/>
-              <a:t>2/3/2026</a:t>
+              <a:t>2/4/2026</a:t>
             </a:fld>
             <a:endParaRPr lang="en-US"/>
           </a:p>
@@ -5943,7 +6004,7 @@
           <a:p>
             <a:fld id="{B616CDE8-C118-489E-BA54-73CDE3A64F8D}" type="datetimeFigureOut">
               <a:rPr lang="en-US" smtClean="0"/>
-              <a:t>2/3/2026</a:t>
+              <a:t>2/4/2026</a:t>
             </a:fld>
             <a:endParaRPr lang="en-US"/>
           </a:p>
@@ -6084,7 +6145,7 @@
           <a:p>
             <a:fld id="{B616CDE8-C118-489E-BA54-73CDE3A64F8D}" type="datetimeFigureOut">
               <a:rPr lang="en-US" smtClean="0"/>
-              <a:t>2/3/2026</a:t>
+              <a:t>2/4/2026</a:t>
             </a:fld>
             <a:endParaRPr lang="en-US"/>
           </a:p>
@@ -6197,7 +6258,7 @@
           <a:p>
             <a:fld id="{B616CDE8-C118-489E-BA54-73CDE3A64F8D}" type="datetimeFigureOut">
               <a:rPr lang="en-US" smtClean="0"/>
-              <a:t>2/3/2026</a:t>
+              <a:t>2/4/2026</a:t>
             </a:fld>
             <a:endParaRPr lang="en-US"/>
           </a:p>
@@ -6508,7 +6569,7 @@
           <a:p>
             <a:fld id="{B616CDE8-C118-489E-BA54-73CDE3A64F8D}" type="datetimeFigureOut">
               <a:rPr lang="en-US" smtClean="0"/>
-              <a:t>2/3/2026</a:t>
+              <a:t>2/4/2026</a:t>
             </a:fld>
             <a:endParaRPr lang="en-US"/>
           </a:p>
@@ -6796,7 +6857,7 @@
           <a:p>
             <a:fld id="{B616CDE8-C118-489E-BA54-73CDE3A64F8D}" type="datetimeFigureOut">
               <a:rPr lang="en-US" smtClean="0"/>
-              <a:t>2/3/2026</a:t>
+              <a:t>2/4/2026</a:t>
             </a:fld>
             <a:endParaRPr lang="en-US"/>
           </a:p>
@@ -7037,7 +7098,7 @@
           <a:p>
             <a:fld id="{B616CDE8-C118-489E-BA54-73CDE3A64F8D}" type="datetimeFigureOut">
               <a:rPr lang="en-US" smtClean="0"/>
-              <a:t>2/3/2026</a:t>
+              <a:t>2/4/2026</a:t>
             </a:fld>
             <a:endParaRPr lang="en-US"/>
           </a:p>
@@ -7605,7 +7666,7 @@
           <a:p>
             <a:fld id="{B9268321-C9E7-441E-8ECB-F5B48CA38B30}" type="datetimeFigureOut">
               <a:rPr lang="en-US" smtClean="0"/>
-              <a:t>2/3/2026</a:t>
+              <a:t>2/4/2026</a:t>
             </a:fld>
             <a:endParaRPr lang="en-US"/>
           </a:p>
@@ -29198,8 +29259,8 @@
         </p:blipFill>
         <p:spPr>
           <a:xfrm>
-            <a:off x="109331" y="2588353"/>
-            <a:ext cx="7354139" cy="2500483"/>
+            <a:off x="194492" y="2108062"/>
+            <a:ext cx="8822224" cy="2999647"/>
           </a:xfrm>
           <a:prstGeom prst="rect">
             <a:avLst/>
@@ -29664,10 +29725,16 @@
           <p:cNvGraphicFramePr>
             <a:graphicFrameLocks noGrp="1"/>
           </p:cNvGraphicFramePr>
-          <p:nvPr/>
+          <p:nvPr>
+            <p:extLst>
+              <p:ext uri="{D42A27DB-BD31-4B8C-83A1-F6EECF244321}">
+                <p14:modId xmlns:p14="http://schemas.microsoft.com/office/powerpoint/2010/main" val="2727965601"/>
+              </p:ext>
+            </p:extLst>
+          </p:nvPr>
         </p:nvGraphicFramePr>
         <p:xfrm>
-          <a:off x="3786400" y="1485433"/>
+          <a:off x="5854717" y="1226815"/>
           <a:ext cx="6142791" cy="729404"/>
         </p:xfrm>
         <a:graphic>
@@ -30769,8 +30836,8 @@
         </p:blipFill>
         <p:spPr>
           <a:xfrm>
-            <a:off x="4445642" y="1807331"/>
-            <a:ext cx="7112374" cy="3013942"/>
+            <a:off x="4223968" y="1764495"/>
+            <a:ext cx="7855879" cy="3329010"/>
           </a:xfrm>
           <a:prstGeom prst="rect">
             <a:avLst/>
@@ -30858,10 +30925,16 @@
           <p:cNvGraphicFramePr>
             <a:graphicFrameLocks noGrp="1"/>
           </p:cNvGraphicFramePr>
-          <p:nvPr/>
+          <p:nvPr>
+            <p:extLst>
+              <p:ext uri="{D42A27DB-BD31-4B8C-83A1-F6EECF244321}">
+                <p14:modId xmlns:p14="http://schemas.microsoft.com/office/powerpoint/2010/main" val="596315507"/>
+              </p:ext>
+            </p:extLst>
+          </p:nvPr>
         </p:nvGraphicFramePr>
         <p:xfrm>
-          <a:off x="5793840" y="1503614"/>
+          <a:off x="6059055" y="1627174"/>
           <a:ext cx="5944273" cy="3603651"/>
         </p:xfrm>
         <a:graphic>
@@ -31842,8 +31915,8 @@
         </p:blipFill>
         <p:spPr>
           <a:xfrm>
-            <a:off x="338459" y="1503613"/>
-            <a:ext cx="4678163" cy="3555404"/>
+            <a:off x="338459" y="1503612"/>
+            <a:ext cx="5252662" cy="3992023"/>
           </a:xfrm>
           <a:prstGeom prst="rect">
             <a:avLst/>

</xml_diff>